<commit_message>
Adding job sequencing algorithm
</commit_message>
<xml_diff>
--- a/161702/presentation/10 - Greedy Algorithm 2/10. Greedy Algorithm (2).pptx
+++ b/161702/presentation/10 - Greedy Algorithm 2/10. Greedy Algorithm (2).pptx
@@ -5,7 +5,7 @@
     <p:sldMasterId id="2147483672" r:id="rId1"/>
   </p:sldMasterIdLst>
   <p:notesMasterIdLst>
-    <p:notesMasterId r:id="rId40"/>
+    <p:notesMasterId r:id="rId43"/>
   </p:notesMasterIdLst>
   <p:sldIdLst>
     <p:sldId id="256" r:id="rId2"/>
@@ -33,19 +33,22 @@
     <p:sldId id="302" r:id="rId24"/>
     <p:sldId id="303" r:id="rId25"/>
     <p:sldId id="281" r:id="rId26"/>
-    <p:sldId id="298" r:id="rId27"/>
-    <p:sldId id="299" r:id="rId28"/>
+    <p:sldId id="299" r:id="rId27"/>
+    <p:sldId id="298" r:id="rId28"/>
     <p:sldId id="304" r:id="rId29"/>
     <p:sldId id="305" r:id="rId30"/>
     <p:sldId id="300" r:id="rId31"/>
-    <p:sldId id="301" r:id="rId32"/>
-    <p:sldId id="283" r:id="rId33"/>
-    <p:sldId id="284" r:id="rId34"/>
-    <p:sldId id="285" r:id="rId35"/>
-    <p:sldId id="262" r:id="rId36"/>
-    <p:sldId id="278" r:id="rId37"/>
-    <p:sldId id="279" r:id="rId38"/>
-    <p:sldId id="280" r:id="rId39"/>
+    <p:sldId id="307" r:id="rId32"/>
+    <p:sldId id="301" r:id="rId33"/>
+    <p:sldId id="308" r:id="rId34"/>
+    <p:sldId id="306" r:id="rId35"/>
+    <p:sldId id="283" r:id="rId36"/>
+    <p:sldId id="284" r:id="rId37"/>
+    <p:sldId id="285" r:id="rId38"/>
+    <p:sldId id="262" r:id="rId39"/>
+    <p:sldId id="278" r:id="rId40"/>
+    <p:sldId id="279" r:id="rId41"/>
+    <p:sldId id="280" r:id="rId42"/>
   </p:sldIdLst>
   <p:sldSz cx="9144000" cy="6858000" type="screen4x3"/>
   <p:notesSz cx="6858000" cy="9144000"/>
@@ -234,7 +237,7 @@
           <a:p>
             <a:fld id="{5939F4E3-8BDD-4AA5-AC28-DFF8CE22DD48}" type="datetimeFigureOut">
               <a:rPr lang="en-US" smtClean="0"/>
-              <a:t>4/25/2017</a:t>
+              <a:t>5/2/2017</a:t>
             </a:fld>
             <a:endParaRPr lang="en-US"/>
           </a:p>
@@ -2481,7 +2484,7 @@
           <a:p>
             <a:fld id="{EEC58B07-EB7E-44AD-A74F-F52443C83A19}" type="datetimeFigureOut">
               <a:rPr lang="en-US" smtClean="0"/>
-              <a:t>4/25/2017</a:t>
+              <a:t>5/2/2017</a:t>
             </a:fld>
             <a:endParaRPr lang="en-US"/>
           </a:p>
@@ -2659,7 +2662,7 @@
           <a:p>
             <a:fld id="{EEC58B07-EB7E-44AD-A74F-F52443C83A19}" type="datetimeFigureOut">
               <a:rPr lang="en-US" smtClean="0"/>
-              <a:t>4/25/2017</a:t>
+              <a:t>5/2/2017</a:t>
             </a:fld>
             <a:endParaRPr lang="en-US"/>
           </a:p>
@@ -2839,7 +2842,7 @@
           <a:p>
             <a:fld id="{EEC58B07-EB7E-44AD-A74F-F52443C83A19}" type="datetimeFigureOut">
               <a:rPr lang="en-US" smtClean="0"/>
-              <a:t>4/25/2017</a:t>
+              <a:t>5/2/2017</a:t>
             </a:fld>
             <a:endParaRPr lang="en-US"/>
           </a:p>
@@ -3083,7 +3086,7 @@
             <a:fld id="{E22EDF8C-5B3B-445A-AF06-0E8B295A5406}" type="datetime1">
               <a:rPr lang="zh-TW" altLang="en-US"/>
               <a:pPr/>
-              <a:t>2017/4/25</a:t>
+              <a:t>2017/5/2</a:t>
             </a:fld>
             <a:endParaRPr lang="en-US" altLang="zh-TW"/>
           </a:p>
@@ -3405,7 +3408,7 @@
             <a:fld id="{320B7D7E-A39D-4478-B1D4-9E28DF41077B}" type="datetime1">
               <a:rPr lang="zh-TW" altLang="en-US"/>
               <a:pPr/>
-              <a:t>2017/4/25</a:t>
+              <a:t>2017/5/2</a:t>
             </a:fld>
             <a:endParaRPr lang="en-US" altLang="zh-TW"/>
           </a:p>
@@ -3637,7 +3640,7 @@
           <a:p>
             <a:fld id="{EEC58B07-EB7E-44AD-A74F-F52443C83A19}" type="datetimeFigureOut">
               <a:rPr lang="en-US" smtClean="0"/>
-              <a:t>4/25/2017</a:t>
+              <a:t>5/2/2017</a:t>
             </a:fld>
             <a:endParaRPr lang="en-US"/>
           </a:p>
@@ -3887,7 +3890,7 @@
           <a:p>
             <a:fld id="{EEC58B07-EB7E-44AD-A74F-F52443C83A19}" type="datetimeFigureOut">
               <a:rPr lang="en-US" smtClean="0"/>
-              <a:t>4/25/2017</a:t>
+              <a:t>5/2/2017</a:t>
             </a:fld>
             <a:endParaRPr lang="en-US"/>
           </a:p>
@@ -4127,7 +4130,7 @@
           <a:p>
             <a:fld id="{EEC58B07-EB7E-44AD-A74F-F52443C83A19}" type="datetimeFigureOut">
               <a:rPr lang="en-US" smtClean="0"/>
-              <a:t>4/25/2017</a:t>
+              <a:t>5/2/2017</a:t>
             </a:fld>
             <a:endParaRPr lang="en-US"/>
           </a:p>
@@ -4502,7 +4505,7 @@
           <a:p>
             <a:fld id="{EEC58B07-EB7E-44AD-A74F-F52443C83A19}" type="datetimeFigureOut">
               <a:rPr lang="en-US" smtClean="0"/>
-              <a:t>4/25/2017</a:t>
+              <a:t>5/2/2017</a:t>
             </a:fld>
             <a:endParaRPr lang="en-US"/>
           </a:p>
@@ -4628,7 +4631,7 @@
           <a:p>
             <a:fld id="{EEC58B07-EB7E-44AD-A74F-F52443C83A19}" type="datetimeFigureOut">
               <a:rPr lang="en-US" smtClean="0"/>
-              <a:t>4/25/2017</a:t>
+              <a:t>5/2/2017</a:t>
             </a:fld>
             <a:endParaRPr lang="en-US"/>
           </a:p>
@@ -4723,7 +4726,7 @@
           <a:p>
             <a:fld id="{EEC58B07-EB7E-44AD-A74F-F52443C83A19}" type="datetimeFigureOut">
               <a:rPr lang="en-US" smtClean="0"/>
-              <a:t>4/25/2017</a:t>
+              <a:t>5/2/2017</a:t>
             </a:fld>
             <a:endParaRPr lang="en-US"/>
           </a:p>
@@ -5000,7 +5003,7 @@
           <a:p>
             <a:fld id="{EEC58B07-EB7E-44AD-A74F-F52443C83A19}" type="datetimeFigureOut">
               <a:rPr lang="en-US" smtClean="0"/>
-              <a:t>4/25/2017</a:t>
+              <a:t>5/2/2017</a:t>
             </a:fld>
             <a:endParaRPr lang="en-US"/>
           </a:p>
@@ -5257,7 +5260,7 @@
           <a:p>
             <a:fld id="{EEC58B07-EB7E-44AD-A74F-F52443C83A19}" type="datetimeFigureOut">
               <a:rPr lang="en-US" smtClean="0"/>
-              <a:t>4/25/2017</a:t>
+              <a:t>5/2/2017</a:t>
             </a:fld>
             <a:endParaRPr lang="en-US"/>
           </a:p>
@@ -5470,7 +5473,7 @@
           <a:p>
             <a:fld id="{EEC58B07-EB7E-44AD-A74F-F52443C83A19}" type="datetimeFigureOut">
               <a:rPr lang="en-US" smtClean="0"/>
-              <a:t>4/25/2017</a:t>
+              <a:t>5/2/2017</a:t>
             </a:fld>
             <a:endParaRPr lang="en-US"/>
           </a:p>
@@ -5909,11 +5912,7 @@
           <a:p>
             <a:r>
               <a:rPr lang="en-US" dirty="0" smtClean="0"/>
-              <a:t>10. </a:t>
-            </a:r>
-            <a:r>
-              <a:rPr lang="en-US" dirty="0" smtClean="0"/>
-              <a:t>Greedy Algorithm (1)</a:t>
+              <a:t>10. Greedy Algorithm (1)</a:t>
             </a:r>
             <a:endParaRPr lang="en-US" dirty="0"/>
           </a:p>
@@ -18288,7 +18287,7 @@
           <a:graphicData uri="http://schemas.openxmlformats.org/presentationml/2006/ole">
             <mc:AlternateContent xmlns:mc="http://schemas.openxmlformats.org/markup-compatibility/2006">
               <mc:Choice xmlns:v="urn:schemas-microsoft-com:vml" Requires="v">
-                <p:oleObj spid="_x0000_s2084" name="方程式" r:id="rId3" imgW="469800" imgH="266400" progId="Equation.3">
+                <p:oleObj spid="_x0000_s2098" name="方程式" r:id="rId3" imgW="469800" imgH="266400" progId="Equation.3">
                   <p:embed/>
                 </p:oleObj>
               </mc:Choice>
@@ -18404,6 +18403,90 @@
       </p:grpSpPr>
       <p:sp>
         <p:nvSpPr>
+          <p:cNvPr id="2" name="Title 1"/>
+          <p:cNvSpPr>
+            <a:spLocks noGrp="1"/>
+          </p:cNvSpPr>
+          <p:nvPr>
+            <p:ph type="title"/>
+          </p:nvPr>
+        </p:nvSpPr>
+        <p:spPr/>
+        <p:txBody>
+          <a:bodyPr/>
+          <a:lstStyle/>
+          <a:p>
+            <a:r>
+              <a:rPr lang="en-US" dirty="0" smtClean="0"/>
+              <a:t>Example: Job Sequencing</a:t>
+            </a:r>
+            <a:endParaRPr lang="en-US" dirty="0"/>
+          </a:p>
+        </p:txBody>
+      </p:sp>
+      <p:pic>
+        <p:nvPicPr>
+          <p:cNvPr id="3" name="Picture 2"/>
+          <p:cNvPicPr>
+            <a:picLocks noChangeAspect="1"/>
+          </p:cNvPicPr>
+          <p:nvPr/>
+        </p:nvPicPr>
+        <p:blipFill>
+          <a:blip r:embed="rId2"/>
+          <a:stretch>
+            <a:fillRect/>
+          </a:stretch>
+        </p:blipFill>
+        <p:spPr>
+          <a:xfrm>
+            <a:off x="370320" y="1995486"/>
+            <a:ext cx="8403360" cy="3749040"/>
+          </a:xfrm>
+          <a:prstGeom prst="rect">
+            <a:avLst/>
+          </a:prstGeom>
+        </p:spPr>
+      </p:pic>
+    </p:spTree>
+    <p:extLst>
+      <p:ext uri="{BB962C8B-B14F-4D97-AF65-F5344CB8AC3E}">
+        <p14:creationId xmlns:p14="http://schemas.microsoft.com/office/powerpoint/2010/main" val="837971851"/>
+      </p:ext>
+    </p:extLst>
+  </p:cSld>
+  <p:clrMapOvr>
+    <a:masterClrMapping/>
+  </p:clrMapOvr>
+  <p:timing>
+    <p:tnLst>
+      <p:par>
+        <p:cTn id="1" dur="indefinite" restart="never" nodeType="tmRoot"/>
+      </p:par>
+    </p:tnLst>
+  </p:timing>
+</p:sld>
+</file>
+
+<file path=ppt/slides/slide27.xml><?xml version="1.0" encoding="utf-8"?>
+<p:sld xmlns:a="http://schemas.openxmlformats.org/drawingml/2006/main" xmlns:r="http://schemas.openxmlformats.org/officeDocument/2006/relationships" xmlns:p="http://schemas.openxmlformats.org/presentationml/2006/main">
+  <p:cSld>
+    <p:spTree>
+      <p:nvGrpSpPr>
+        <p:cNvPr id="1" name=""/>
+        <p:cNvGrpSpPr/>
+        <p:nvPr/>
+      </p:nvGrpSpPr>
+      <p:grpSpPr>
+        <a:xfrm>
+          <a:off x="0" y="0"/>
+          <a:ext cx="0" cy="0"/>
+          <a:chOff x="0" y="0"/>
+          <a:chExt cx="0" cy="0"/>
+        </a:xfrm>
+      </p:grpSpPr>
+      <p:sp>
+        <p:nvSpPr>
           <p:cNvPr id="5" name="Title 4"/>
           <p:cNvSpPr>
             <a:spLocks noGrp="1"/>
@@ -18474,92 +18557,8 @@
 </p:sld>
 </file>
 
-<file path=ppt/slides/slide27.xml><?xml version="1.0" encoding="utf-8"?>
-<p:sld xmlns:a="http://schemas.openxmlformats.org/drawingml/2006/main" xmlns:r="http://schemas.openxmlformats.org/officeDocument/2006/relationships" xmlns:p="http://schemas.openxmlformats.org/presentationml/2006/main">
-  <p:cSld>
-    <p:spTree>
-      <p:nvGrpSpPr>
-        <p:cNvPr id="1" name=""/>
-        <p:cNvGrpSpPr/>
-        <p:nvPr/>
-      </p:nvGrpSpPr>
-      <p:grpSpPr>
-        <a:xfrm>
-          <a:off x="0" y="0"/>
-          <a:ext cx="0" cy="0"/>
-          <a:chOff x="0" y="0"/>
-          <a:chExt cx="0" cy="0"/>
-        </a:xfrm>
-      </p:grpSpPr>
-      <p:sp>
-        <p:nvSpPr>
-          <p:cNvPr id="2" name="Title 1"/>
-          <p:cNvSpPr>
-            <a:spLocks noGrp="1"/>
-          </p:cNvSpPr>
-          <p:nvPr>
-            <p:ph type="title"/>
-          </p:nvPr>
-        </p:nvSpPr>
-        <p:spPr/>
-        <p:txBody>
-          <a:bodyPr/>
-          <a:lstStyle/>
-          <a:p>
-            <a:r>
-              <a:rPr lang="en-US" dirty="0" smtClean="0"/>
-              <a:t>Example: Job Sequencing</a:t>
-            </a:r>
-            <a:endParaRPr lang="en-US" dirty="0"/>
-          </a:p>
-        </p:txBody>
-      </p:sp>
-      <p:pic>
-        <p:nvPicPr>
-          <p:cNvPr id="3" name="Picture 2"/>
-          <p:cNvPicPr>
-            <a:picLocks noChangeAspect="1"/>
-          </p:cNvPicPr>
-          <p:nvPr/>
-        </p:nvPicPr>
-        <p:blipFill>
-          <a:blip r:embed="rId2"/>
-          <a:stretch>
-            <a:fillRect/>
-          </a:stretch>
-        </p:blipFill>
-        <p:spPr>
-          <a:xfrm>
-            <a:off x="370320" y="1995486"/>
-            <a:ext cx="8403360" cy="3749040"/>
-          </a:xfrm>
-          <a:prstGeom prst="rect">
-            <a:avLst/>
-          </a:prstGeom>
-        </p:spPr>
-      </p:pic>
-    </p:spTree>
-    <p:extLst>
-      <p:ext uri="{BB962C8B-B14F-4D97-AF65-F5344CB8AC3E}">
-        <p14:creationId xmlns:p14="http://schemas.microsoft.com/office/powerpoint/2010/main" val="837971851"/>
-      </p:ext>
-    </p:extLst>
-  </p:cSld>
-  <p:clrMapOvr>
-    <a:masterClrMapping/>
-  </p:clrMapOvr>
-  <p:timing>
-    <p:tnLst>
-      <p:par>
-        <p:cTn id="1" dur="indefinite" restart="never" nodeType="tmRoot"/>
-      </p:par>
-    </p:tnLst>
-  </p:timing>
-</p:sld>
-</file>
-
 <file path=ppt/slides/slide28.xml><?xml version="1.0" encoding="utf-8"?>
-<p:sld xmlns:a="http://schemas.openxmlformats.org/drawingml/2006/main" xmlns:r="http://schemas.openxmlformats.org/officeDocument/2006/relationships" xmlns:p="http://schemas.openxmlformats.org/presentationml/2006/main">
+<p:sld xmlns:a="http://schemas.openxmlformats.org/drawingml/2006/main" xmlns:r="http://schemas.openxmlformats.org/officeDocument/2006/relationships" xmlns:p="http://schemas.openxmlformats.org/presentationml/2006/main" show="0">
   <p:cSld>
     <p:spTree>
       <p:nvGrpSpPr>
@@ -19004,6 +19003,14 @@
   <p:clrMapOvr>
     <a:masterClrMapping/>
   </p:clrMapOvr>
+  <mc:AlternateContent xmlns:mc="http://schemas.openxmlformats.org/markup-compatibility/2006">
+    <mc:Choice xmlns:p14="http://schemas.microsoft.com/office/powerpoint/2010/main" Requires="p14">
+      <p:transition spd="slow" p14:dur="2000"/>
+    </mc:Choice>
+    <mc:Fallback>
+      <p:transition spd="slow"/>
+    </mc:Fallback>
+  </mc:AlternateContent>
   <p:timing>
     <p:tnLst>
       <p:par>
@@ -19015,7 +19022,7 @@
 </file>
 
 <file path=ppt/slides/slide29.xml><?xml version="1.0" encoding="utf-8"?>
-<p:sld xmlns:a="http://schemas.openxmlformats.org/drawingml/2006/main" xmlns:r="http://schemas.openxmlformats.org/officeDocument/2006/relationships" xmlns:p="http://schemas.openxmlformats.org/presentationml/2006/main">
+<p:sld xmlns:a="http://schemas.openxmlformats.org/drawingml/2006/main" xmlns:r="http://schemas.openxmlformats.org/officeDocument/2006/relationships" xmlns:p="http://schemas.openxmlformats.org/presentationml/2006/main" show="0">
   <p:cSld>
     <p:spTree>
       <p:nvGrpSpPr>
@@ -19108,23 +19115,13 @@
           <a:p>
             <a:r>
               <a:rPr lang="en-US" dirty="0" smtClean="0"/>
-              <a:t>Please collect the </a:t>
-            </a:r>
-            <a:r>
-              <a:rPr lang="en-US" dirty="0" smtClean="0"/>
-              <a:t>hardcopy </a:t>
+              <a:t>Please collect the hardcopy </a:t>
             </a:r>
             <a:r>
               <a:rPr lang="en-US" dirty="0" smtClean="0">
                 <a:sym typeface="Wingdings" panose="05000000000000000000" pitchFamily="2" charset="2"/>
               </a:rPr>
-              <a:t> 2 pseudocodes, 2 implementations, </a:t>
-            </a:r>
-            <a:r>
-              <a:rPr lang="en-US" smtClean="0">
-                <a:sym typeface="Wingdings" panose="05000000000000000000" pitchFamily="2" charset="2"/>
-              </a:rPr>
-              <a:t>1 evaluation</a:t>
+              <a:t> 2 pseudocodes, 2 implementations, 1 evaluation</a:t>
             </a:r>
             <a:endParaRPr lang="en-US" dirty="0" smtClean="0"/>
           </a:p>
@@ -19140,6 +19137,14 @@
   <p:clrMapOvr>
     <a:masterClrMapping/>
   </p:clrMapOvr>
+  <mc:AlternateContent xmlns:mc="http://schemas.openxmlformats.org/markup-compatibility/2006">
+    <mc:Choice xmlns:p14="http://schemas.microsoft.com/office/powerpoint/2010/main" Requires="p14">
+      <p:transition spd="slow" p14:dur="2000"/>
+    </mc:Choice>
+    <mc:Fallback>
+      <p:transition spd="slow"/>
+    </mc:Fallback>
+  </mc:AlternateContent>
   <p:timing>
     <p:tnLst>
       <p:par>
@@ -20420,6 +20425,658 @@
           </p:cNvGraphicFramePr>
           <p:nvPr>
             <p:ph idx="1"/>
+            <p:extLst/>
+          </p:nvPr>
+        </p:nvGraphicFramePr>
+        <p:xfrm>
+          <a:off x="628650" y="1545698"/>
+          <a:ext cx="7886700" cy="5181600"/>
+        </p:xfrm>
+        <a:graphic>
+          <a:graphicData uri="http://schemas.openxmlformats.org/drawingml/2006/table">
+            <a:tbl>
+              <a:tblPr firstRow="1" bandRow="1">
+                <a:tableStyleId>{5C22544A-7EE6-4342-B048-85BDC9FD1C3A}</a:tableStyleId>
+              </a:tblPr>
+              <a:tblGrid>
+                <a:gridCol w="2628900">
+                  <a:extLst>
+                    <a:ext uri="{9D8B030D-6E8A-4147-A177-3AD203B41FA5}">
+                      <a16:colId xmlns:a16="http://schemas.microsoft.com/office/drawing/2014/main" val="20000"/>
+                    </a:ext>
+                  </a:extLst>
+                </a:gridCol>
+                <a:gridCol w="2628900">
+                  <a:extLst>
+                    <a:ext uri="{9D8B030D-6E8A-4147-A177-3AD203B41FA5}">
+                      <a16:colId xmlns:a16="http://schemas.microsoft.com/office/drawing/2014/main" val="20001"/>
+                    </a:ext>
+                  </a:extLst>
+                </a:gridCol>
+                <a:gridCol w="2628900">
+                  <a:extLst>
+                    <a:ext uri="{9D8B030D-6E8A-4147-A177-3AD203B41FA5}">
+                      <a16:colId xmlns:a16="http://schemas.microsoft.com/office/drawing/2014/main" val="20002"/>
+                    </a:ext>
+                  </a:extLst>
+                </a:gridCol>
+              </a:tblGrid>
+              <a:tr h="451005">
+                <a:tc>
+                  <a:txBody>
+                    <a:bodyPr/>
+                    <a:lstStyle/>
+                    <a:p>
+                      <a:pPr algn="ctr"/>
+                      <a:r>
+                        <a:rPr lang="en-US" sz="2800" dirty="0" smtClean="0"/>
+                        <a:t>Tasks</a:t>
+                      </a:r>
+                      <a:endParaRPr lang="en-US" sz="2800" dirty="0"/>
+                    </a:p>
+                  </a:txBody>
+                  <a:tcPr/>
+                </a:tc>
+                <a:tc>
+                  <a:txBody>
+                    <a:bodyPr/>
+                    <a:lstStyle/>
+                    <a:p>
+                      <a:pPr algn="ctr"/>
+                      <a:r>
+                        <a:rPr lang="en-US" sz="2800" dirty="0" smtClean="0"/>
+                        <a:t>Deadlines</a:t>
+                      </a:r>
+                      <a:endParaRPr lang="en-US" sz="2800" dirty="0"/>
+                    </a:p>
+                  </a:txBody>
+                  <a:tcPr/>
+                </a:tc>
+                <a:tc>
+                  <a:txBody>
+                    <a:bodyPr/>
+                    <a:lstStyle/>
+                    <a:p>
+                      <a:pPr algn="ctr"/>
+                      <a:r>
+                        <a:rPr lang="en-US" sz="2800" dirty="0" smtClean="0"/>
+                        <a:t>Profit</a:t>
+                      </a:r>
+                      <a:endParaRPr lang="en-US" sz="2800" dirty="0"/>
+                    </a:p>
+                  </a:txBody>
+                  <a:tcPr/>
+                </a:tc>
+                <a:extLst>
+                  <a:ext uri="{0D108BD9-81ED-4DB2-BD59-A6C34878D82A}">
+                    <a16:rowId xmlns:a16="http://schemas.microsoft.com/office/drawing/2014/main" val="10000"/>
+                  </a:ext>
+                </a:extLst>
+              </a:tr>
+              <a:tr h="451005">
+                <a:tc>
+                  <a:txBody>
+                    <a:bodyPr/>
+                    <a:lstStyle/>
+                    <a:p>
+                      <a:pPr algn="ctr"/>
+                      <a:r>
+                        <a:rPr lang="en-US" sz="2800" dirty="0" smtClean="0"/>
+                        <a:t>T3</a:t>
+                      </a:r>
+                      <a:endParaRPr lang="en-US" sz="2800" dirty="0"/>
+                    </a:p>
+                  </a:txBody>
+                  <a:tcPr/>
+                </a:tc>
+                <a:tc>
+                  <a:txBody>
+                    <a:bodyPr/>
+                    <a:lstStyle/>
+                    <a:p>
+                      <a:pPr algn="ctr"/>
+                      <a:r>
+                        <a:rPr lang="en-US" sz="2800" dirty="0" smtClean="0"/>
+                        <a:t>5</a:t>
+                      </a:r>
+                      <a:endParaRPr lang="en-US" sz="2800" dirty="0"/>
+                    </a:p>
+                  </a:txBody>
+                  <a:tcPr/>
+                </a:tc>
+                <a:tc>
+                  <a:txBody>
+                    <a:bodyPr/>
+                    <a:lstStyle/>
+                    <a:p>
+                      <a:pPr algn="ctr"/>
+                      <a:r>
+                        <a:rPr lang="en-US" sz="2800" dirty="0" smtClean="0"/>
+                        <a:t>30</a:t>
+                      </a:r>
+                      <a:endParaRPr lang="en-US" sz="2800" dirty="0"/>
+                    </a:p>
+                  </a:txBody>
+                  <a:tcPr/>
+                </a:tc>
+                <a:extLst>
+                  <a:ext uri="{0D108BD9-81ED-4DB2-BD59-A6C34878D82A}">
+                    <a16:rowId xmlns:a16="http://schemas.microsoft.com/office/drawing/2014/main" val="10001"/>
+                  </a:ext>
+                </a:extLst>
+              </a:tr>
+              <a:tr h="451005">
+                <a:tc>
+                  <a:txBody>
+                    <a:bodyPr/>
+                    <a:lstStyle/>
+                    <a:p>
+                      <a:pPr algn="ctr"/>
+                      <a:r>
+                        <a:rPr lang="en-US" sz="2800" dirty="0" smtClean="0"/>
+                        <a:t>T9</a:t>
+                      </a:r>
+                      <a:endParaRPr lang="en-US" sz="2800" dirty="0"/>
+                    </a:p>
+                  </a:txBody>
+                  <a:tcPr/>
+                </a:tc>
+                <a:tc>
+                  <a:txBody>
+                    <a:bodyPr/>
+                    <a:lstStyle/>
+                    <a:p>
+                      <a:pPr algn="ctr"/>
+                      <a:r>
+                        <a:rPr lang="en-US" sz="2800" dirty="0" smtClean="0"/>
+                        <a:t>3</a:t>
+                      </a:r>
+                      <a:endParaRPr lang="en-US" sz="2800" dirty="0"/>
+                    </a:p>
+                  </a:txBody>
+                  <a:tcPr/>
+                </a:tc>
+                <a:tc>
+                  <a:txBody>
+                    <a:bodyPr/>
+                    <a:lstStyle/>
+                    <a:p>
+                      <a:pPr algn="ctr"/>
+                      <a:r>
+                        <a:rPr lang="en-US" sz="2800" dirty="0" smtClean="0"/>
+                        <a:t>25</a:t>
+                      </a:r>
+                      <a:endParaRPr lang="en-US" sz="2800" dirty="0"/>
+                    </a:p>
+                  </a:txBody>
+                  <a:tcPr/>
+                </a:tc>
+                <a:extLst>
+                  <a:ext uri="{0D108BD9-81ED-4DB2-BD59-A6C34878D82A}">
+                    <a16:rowId xmlns:a16="http://schemas.microsoft.com/office/drawing/2014/main" val="10002"/>
+                  </a:ext>
+                </a:extLst>
+              </a:tr>
+              <a:tr h="451005">
+                <a:tc>
+                  <a:txBody>
+                    <a:bodyPr/>
+                    <a:lstStyle/>
+                    <a:p>
+                      <a:pPr algn="ctr"/>
+                      <a:r>
+                        <a:rPr lang="en-US" sz="2800" dirty="0" smtClean="0"/>
+                        <a:t>T7</a:t>
+                      </a:r>
+                      <a:endParaRPr lang="en-US" sz="2800" dirty="0"/>
+                    </a:p>
+                  </a:txBody>
+                  <a:tcPr/>
+                </a:tc>
+                <a:tc>
+                  <a:txBody>
+                    <a:bodyPr/>
+                    <a:lstStyle/>
+                    <a:p>
+                      <a:pPr algn="ctr"/>
+                      <a:r>
+                        <a:rPr lang="en-US" sz="2800" dirty="0" smtClean="0"/>
+                        <a:t>2</a:t>
+                      </a:r>
+                      <a:endParaRPr lang="en-US" sz="2800" dirty="0"/>
+                    </a:p>
+                  </a:txBody>
+                  <a:tcPr/>
+                </a:tc>
+                <a:tc>
+                  <a:txBody>
+                    <a:bodyPr/>
+                    <a:lstStyle/>
+                    <a:p>
+                      <a:pPr algn="ctr"/>
+                      <a:r>
+                        <a:rPr lang="en-US" sz="2800" dirty="0" smtClean="0"/>
+                        <a:t>23</a:t>
+                      </a:r>
+                      <a:endParaRPr lang="en-US" sz="2800" dirty="0"/>
+                    </a:p>
+                  </a:txBody>
+                  <a:tcPr/>
+                </a:tc>
+                <a:extLst>
+                  <a:ext uri="{0D108BD9-81ED-4DB2-BD59-A6C34878D82A}">
+                    <a16:rowId xmlns:a16="http://schemas.microsoft.com/office/drawing/2014/main" val="10003"/>
+                  </a:ext>
+                </a:extLst>
+              </a:tr>
+              <a:tr h="451005">
+                <a:tc>
+                  <a:txBody>
+                    <a:bodyPr/>
+                    <a:lstStyle/>
+                    <a:p>
+                      <a:pPr algn="ctr"/>
+                      <a:r>
+                        <a:rPr lang="en-US" sz="2800" dirty="0" smtClean="0"/>
+                        <a:t>T2</a:t>
+                      </a:r>
+                      <a:endParaRPr lang="en-US" sz="2800" dirty="0"/>
+                    </a:p>
+                  </a:txBody>
+                  <a:tcPr/>
+                </a:tc>
+                <a:tc>
+                  <a:txBody>
+                    <a:bodyPr/>
+                    <a:lstStyle/>
+                    <a:p>
+                      <a:pPr algn="ctr"/>
+                      <a:r>
+                        <a:rPr lang="en-US" sz="2800" dirty="0" smtClean="0"/>
+                        <a:t>2</a:t>
+                      </a:r>
+                      <a:endParaRPr lang="en-US" sz="2800" dirty="0"/>
+                    </a:p>
+                  </a:txBody>
+                  <a:tcPr/>
+                </a:tc>
+                <a:tc>
+                  <a:txBody>
+                    <a:bodyPr/>
+                    <a:lstStyle/>
+                    <a:p>
+                      <a:pPr algn="ctr"/>
+                      <a:r>
+                        <a:rPr lang="en-US" sz="2800" dirty="0" smtClean="0"/>
+                        <a:t>20</a:t>
+                      </a:r>
+                      <a:endParaRPr lang="en-US" sz="2800" dirty="0"/>
+                    </a:p>
+                  </a:txBody>
+                  <a:tcPr/>
+                </a:tc>
+                <a:extLst>
+                  <a:ext uri="{0D108BD9-81ED-4DB2-BD59-A6C34878D82A}">
+                    <a16:rowId xmlns:a16="http://schemas.microsoft.com/office/drawing/2014/main" val="10004"/>
+                  </a:ext>
+                </a:extLst>
+              </a:tr>
+              <a:tr h="451005">
+                <a:tc>
+                  <a:txBody>
+                    <a:bodyPr/>
+                    <a:lstStyle/>
+                    <a:p>
+                      <a:pPr algn="ctr"/>
+                      <a:r>
+                        <a:rPr lang="en-US" sz="2800" dirty="0" smtClean="0"/>
+                        <a:t>T4</a:t>
+                      </a:r>
+                      <a:endParaRPr lang="en-US" sz="2800" dirty="0"/>
+                    </a:p>
+                  </a:txBody>
+                  <a:tcPr>
+                    <a:solidFill>
+                      <a:srgbClr val="FF0000"/>
+                    </a:solidFill>
+                  </a:tcPr>
+                </a:tc>
+                <a:tc>
+                  <a:txBody>
+                    <a:bodyPr/>
+                    <a:lstStyle/>
+                    <a:p>
+                      <a:pPr algn="ctr"/>
+                      <a:r>
+                        <a:rPr lang="en-US" sz="2800" dirty="0" smtClean="0"/>
+                        <a:t>3</a:t>
+                      </a:r>
+                      <a:endParaRPr lang="en-US" sz="2800" dirty="0"/>
+                    </a:p>
+                  </a:txBody>
+                  <a:tcPr>
+                    <a:solidFill>
+                      <a:srgbClr val="FF0000"/>
+                    </a:solidFill>
+                  </a:tcPr>
+                </a:tc>
+                <a:tc>
+                  <a:txBody>
+                    <a:bodyPr/>
+                    <a:lstStyle/>
+                    <a:p>
+                      <a:pPr algn="ctr"/>
+                      <a:r>
+                        <a:rPr lang="en-US" sz="2800" dirty="0" smtClean="0"/>
+                        <a:t>18</a:t>
+                      </a:r>
+                      <a:endParaRPr lang="en-US" sz="2800" dirty="0"/>
+                    </a:p>
+                  </a:txBody>
+                  <a:tcPr>
+                    <a:solidFill>
+                      <a:srgbClr val="FF0000"/>
+                    </a:solidFill>
+                  </a:tcPr>
+                </a:tc>
+                <a:extLst>
+                  <a:ext uri="{0D108BD9-81ED-4DB2-BD59-A6C34878D82A}">
+                    <a16:rowId xmlns:a16="http://schemas.microsoft.com/office/drawing/2014/main" val="10005"/>
+                  </a:ext>
+                </a:extLst>
+              </a:tr>
+              <a:tr h="451005">
+                <a:tc>
+                  <a:txBody>
+                    <a:bodyPr/>
+                    <a:lstStyle/>
+                    <a:p>
+                      <a:pPr algn="ctr"/>
+                      <a:r>
+                        <a:rPr lang="en-US" sz="2800" dirty="0" smtClean="0"/>
+                        <a:t>T5</a:t>
+                      </a:r>
+                      <a:endParaRPr lang="en-US" sz="2800" dirty="0"/>
+                    </a:p>
+                  </a:txBody>
+                  <a:tcPr/>
+                </a:tc>
+                <a:tc>
+                  <a:txBody>
+                    <a:bodyPr/>
+                    <a:lstStyle/>
+                    <a:p>
+                      <a:pPr algn="ctr"/>
+                      <a:r>
+                        <a:rPr lang="en-US" sz="2800" dirty="0" smtClean="0"/>
+                        <a:t>4</a:t>
+                      </a:r>
+                      <a:endParaRPr lang="en-US" sz="2800" dirty="0"/>
+                    </a:p>
+                  </a:txBody>
+                  <a:tcPr/>
+                </a:tc>
+                <a:tc>
+                  <a:txBody>
+                    <a:bodyPr/>
+                    <a:lstStyle/>
+                    <a:p>
+                      <a:pPr algn="ctr"/>
+                      <a:r>
+                        <a:rPr lang="en-US" sz="2800" dirty="0" smtClean="0"/>
+                        <a:t>18</a:t>
+                      </a:r>
+                      <a:endParaRPr lang="en-US" sz="2800" dirty="0"/>
+                    </a:p>
+                  </a:txBody>
+                  <a:tcPr/>
+                </a:tc>
+                <a:extLst>
+                  <a:ext uri="{0D108BD9-81ED-4DB2-BD59-A6C34878D82A}">
+                    <a16:rowId xmlns:a16="http://schemas.microsoft.com/office/drawing/2014/main" val="10006"/>
+                  </a:ext>
+                </a:extLst>
+              </a:tr>
+              <a:tr h="451005">
+                <a:tc>
+                  <a:txBody>
+                    <a:bodyPr/>
+                    <a:lstStyle/>
+                    <a:p>
+                      <a:pPr algn="ctr"/>
+                      <a:r>
+                        <a:rPr lang="en-US" sz="2800" dirty="0" smtClean="0"/>
+                        <a:t>T8</a:t>
+                      </a:r>
+                      <a:endParaRPr lang="en-US" sz="2800" dirty="0"/>
+                    </a:p>
+                  </a:txBody>
+                  <a:tcPr/>
+                </a:tc>
+                <a:tc>
+                  <a:txBody>
+                    <a:bodyPr/>
+                    <a:lstStyle/>
+                    <a:p>
+                      <a:pPr algn="ctr"/>
+                      <a:r>
+                        <a:rPr lang="en-US" sz="2800" dirty="0" smtClean="0"/>
+                        <a:t>7</a:t>
+                      </a:r>
+                      <a:endParaRPr lang="en-US" sz="2800" dirty="0"/>
+                    </a:p>
+                  </a:txBody>
+                  <a:tcPr/>
+                </a:tc>
+                <a:tc>
+                  <a:txBody>
+                    <a:bodyPr/>
+                    <a:lstStyle/>
+                    <a:p>
+                      <a:pPr algn="ctr"/>
+                      <a:r>
+                        <a:rPr lang="en-US" sz="2800" dirty="0" smtClean="0"/>
+                        <a:t>16</a:t>
+                      </a:r>
+                      <a:endParaRPr lang="en-US" sz="2800" dirty="0"/>
+                    </a:p>
+                  </a:txBody>
+                  <a:tcPr/>
+                </a:tc>
+                <a:extLst>
+                  <a:ext uri="{0D108BD9-81ED-4DB2-BD59-A6C34878D82A}">
+                    <a16:rowId xmlns:a16="http://schemas.microsoft.com/office/drawing/2014/main" val="10007"/>
+                  </a:ext>
+                </a:extLst>
+              </a:tr>
+              <a:tr h="451005">
+                <a:tc>
+                  <a:txBody>
+                    <a:bodyPr/>
+                    <a:lstStyle/>
+                    <a:p>
+                      <a:pPr algn="ctr"/>
+                      <a:r>
+                        <a:rPr lang="en-US" sz="2800" dirty="0" smtClean="0"/>
+                        <a:t>T1</a:t>
+                      </a:r>
+                      <a:endParaRPr lang="en-US" sz="2800" dirty="0"/>
+                    </a:p>
+                  </a:txBody>
+                  <a:tcPr/>
+                </a:tc>
+                <a:tc>
+                  <a:txBody>
+                    <a:bodyPr/>
+                    <a:lstStyle/>
+                    <a:p>
+                      <a:pPr algn="ctr"/>
+                      <a:r>
+                        <a:rPr lang="en-US" sz="2800" dirty="0" smtClean="0"/>
+                        <a:t>7</a:t>
+                      </a:r>
+                      <a:endParaRPr lang="en-US" sz="2800" dirty="0"/>
+                    </a:p>
+                  </a:txBody>
+                  <a:tcPr/>
+                </a:tc>
+                <a:tc>
+                  <a:txBody>
+                    <a:bodyPr/>
+                    <a:lstStyle/>
+                    <a:p>
+                      <a:pPr algn="ctr"/>
+                      <a:r>
+                        <a:rPr lang="en-US" sz="2800" dirty="0" smtClean="0"/>
+                        <a:t>15</a:t>
+                      </a:r>
+                      <a:endParaRPr lang="en-US" sz="2800" dirty="0"/>
+                    </a:p>
+                  </a:txBody>
+                  <a:tcPr/>
+                </a:tc>
+                <a:extLst>
+                  <a:ext uri="{0D108BD9-81ED-4DB2-BD59-A6C34878D82A}">
+                    <a16:rowId xmlns:a16="http://schemas.microsoft.com/office/drawing/2014/main" val="10008"/>
+                  </a:ext>
+                </a:extLst>
+              </a:tr>
+              <a:tr h="451005">
+                <a:tc>
+                  <a:txBody>
+                    <a:bodyPr/>
+                    <a:lstStyle/>
+                    <a:p>
+                      <a:pPr algn="ctr"/>
+                      <a:r>
+                        <a:rPr lang="en-US" sz="2800" dirty="0" smtClean="0"/>
+                        <a:t>T6</a:t>
+                      </a:r>
+                      <a:endParaRPr lang="en-US" sz="2800" dirty="0"/>
+                    </a:p>
+                  </a:txBody>
+                  <a:tcPr>
+                    <a:solidFill>
+                      <a:srgbClr val="FF0000"/>
+                    </a:solidFill>
+                  </a:tcPr>
+                </a:tc>
+                <a:tc>
+                  <a:txBody>
+                    <a:bodyPr/>
+                    <a:lstStyle/>
+                    <a:p>
+                      <a:pPr algn="ctr"/>
+                      <a:r>
+                        <a:rPr lang="en-US" sz="2800" dirty="0" smtClean="0"/>
+                        <a:t>5</a:t>
+                      </a:r>
+                      <a:endParaRPr lang="en-US" sz="2800" dirty="0"/>
+                    </a:p>
+                  </a:txBody>
+                  <a:tcPr>
+                    <a:solidFill>
+                      <a:srgbClr val="FF0000"/>
+                    </a:solidFill>
+                  </a:tcPr>
+                </a:tc>
+                <a:tc>
+                  <a:txBody>
+                    <a:bodyPr/>
+                    <a:lstStyle/>
+                    <a:p>
+                      <a:pPr algn="ctr"/>
+                      <a:r>
+                        <a:rPr lang="en-US" sz="2800" dirty="0" smtClean="0"/>
+                        <a:t>10</a:t>
+                      </a:r>
+                      <a:endParaRPr lang="en-US" sz="2800" dirty="0"/>
+                    </a:p>
+                  </a:txBody>
+                  <a:tcPr>
+                    <a:solidFill>
+                      <a:srgbClr val="FF0000"/>
+                    </a:solidFill>
+                  </a:tcPr>
+                </a:tc>
+                <a:extLst>
+                  <a:ext uri="{0D108BD9-81ED-4DB2-BD59-A6C34878D82A}">
+                    <a16:rowId xmlns:a16="http://schemas.microsoft.com/office/drawing/2014/main" val="10009"/>
+                  </a:ext>
+                </a:extLst>
+              </a:tr>
+            </a:tbl>
+          </a:graphicData>
+        </a:graphic>
+      </p:graphicFrame>
+    </p:spTree>
+    <p:extLst>
+      <p:ext uri="{BB962C8B-B14F-4D97-AF65-F5344CB8AC3E}">
+        <p14:creationId xmlns:p14="http://schemas.microsoft.com/office/powerpoint/2010/main" val="1139769362"/>
+      </p:ext>
+    </p:extLst>
+  </p:cSld>
+  <p:clrMapOvr>
+    <a:masterClrMapping/>
+  </p:clrMapOvr>
+  <p:timing>
+    <p:tnLst>
+      <p:par>
+        <p:cTn id="1" dur="indefinite" restart="never" nodeType="tmRoot"/>
+      </p:par>
+    </p:tnLst>
+  </p:timing>
+</p:sld>
+</file>
+
+<file path=ppt/slides/slide32.xml><?xml version="1.0" encoding="utf-8"?>
+<p:sld xmlns:a="http://schemas.openxmlformats.org/drawingml/2006/main" xmlns:r="http://schemas.openxmlformats.org/officeDocument/2006/relationships" xmlns:p="http://schemas.openxmlformats.org/presentationml/2006/main">
+  <p:cSld>
+    <p:spTree>
+      <p:nvGrpSpPr>
+        <p:cNvPr id="1" name=""/>
+        <p:cNvGrpSpPr/>
+        <p:nvPr/>
+      </p:nvGrpSpPr>
+      <p:grpSpPr>
+        <a:xfrm>
+          <a:off x="0" y="0"/>
+          <a:ext cx="0" cy="0"/>
+          <a:chOff x="0" y="0"/>
+          <a:chExt cx="0" cy="0"/>
+        </a:xfrm>
+      </p:grpSpPr>
+      <p:sp>
+        <p:nvSpPr>
+          <p:cNvPr id="2" name="Title 1"/>
+          <p:cNvSpPr>
+            <a:spLocks noGrp="1"/>
+          </p:cNvSpPr>
+          <p:nvPr>
+            <p:ph type="title"/>
+          </p:nvPr>
+        </p:nvSpPr>
+        <p:spPr/>
+        <p:txBody>
+          <a:bodyPr/>
+          <a:lstStyle/>
+          <a:p>
+            <a:r>
+              <a:rPr lang="en-US" dirty="0" smtClean="0"/>
+              <a:t>Example: Job Sequencing</a:t>
+            </a:r>
+            <a:endParaRPr lang="en-US" dirty="0"/>
+          </a:p>
+        </p:txBody>
+      </p:sp>
+      <p:graphicFrame>
+        <p:nvGraphicFramePr>
+          <p:cNvPr id="5" name="Content Placeholder 4"/>
+          <p:cNvGraphicFramePr>
+            <a:graphicFrameLocks noGrp="1"/>
+          </p:cNvGraphicFramePr>
+          <p:nvPr>
+            <p:ph idx="1"/>
             <p:extLst>
               <p:ext uri="{D42A27DB-BD31-4B8C-83A1-F6EECF244321}">
                 <p14:modId xmlns:p14="http://schemas.microsoft.com/office/powerpoint/2010/main" val="3069833536"/>
@@ -21028,7 +21685,327 @@
 </p:sld>
 </file>
 
-<file path=ppt/slides/slide32.xml><?xml version="1.0" encoding="utf-8"?>
+<file path=ppt/slides/slide33.xml><?xml version="1.0" encoding="utf-8"?>
+<p:sld xmlns:a="http://schemas.openxmlformats.org/drawingml/2006/main" xmlns:r="http://schemas.openxmlformats.org/officeDocument/2006/relationships" xmlns:p="http://schemas.openxmlformats.org/presentationml/2006/main">
+  <p:cSld>
+    <p:spTree>
+      <p:nvGrpSpPr>
+        <p:cNvPr id="1" name=""/>
+        <p:cNvGrpSpPr/>
+        <p:nvPr/>
+      </p:nvGrpSpPr>
+      <p:grpSpPr>
+        <a:xfrm>
+          <a:off x="0" y="0"/>
+          <a:ext cx="0" cy="0"/>
+          <a:chOff x="0" y="0"/>
+          <a:chExt cx="0" cy="0"/>
+        </a:xfrm>
+      </p:grpSpPr>
+      <p:sp>
+        <p:nvSpPr>
+          <p:cNvPr id="2" name="Title 1"/>
+          <p:cNvSpPr>
+            <a:spLocks noGrp="1"/>
+          </p:cNvSpPr>
+          <p:nvPr>
+            <p:ph type="title"/>
+          </p:nvPr>
+        </p:nvSpPr>
+        <p:spPr/>
+        <p:txBody>
+          <a:bodyPr/>
+          <a:lstStyle/>
+          <a:p>
+            <a:r>
+              <a:rPr lang="en-US" dirty="0" smtClean="0"/>
+              <a:t>Pseudocode</a:t>
+            </a:r>
+            <a:endParaRPr lang="en-US" dirty="0"/>
+          </a:p>
+        </p:txBody>
+      </p:sp>
+      <p:sp>
+        <p:nvSpPr>
+          <p:cNvPr id="3" name="Content Placeholder 2"/>
+          <p:cNvSpPr>
+            <a:spLocks noGrp="1"/>
+          </p:cNvSpPr>
+          <p:nvPr>
+            <p:ph idx="1"/>
+          </p:nvPr>
+        </p:nvSpPr>
+        <p:spPr/>
+        <p:txBody>
+          <a:bodyPr/>
+          <a:lstStyle/>
+          <a:p>
+            <a:r>
+              <a:rPr lang="en-US" dirty="0" smtClean="0"/>
+              <a:t>Define the pseudocode of job sequencing problem</a:t>
+            </a:r>
+            <a:endParaRPr lang="en-US" dirty="0"/>
+          </a:p>
+        </p:txBody>
+      </p:sp>
+    </p:spTree>
+    <p:extLst>
+      <p:ext uri="{BB962C8B-B14F-4D97-AF65-F5344CB8AC3E}">
+        <p14:creationId xmlns:p14="http://schemas.microsoft.com/office/powerpoint/2010/main" val="3111741716"/>
+      </p:ext>
+    </p:extLst>
+  </p:cSld>
+  <p:clrMapOvr>
+    <a:masterClrMapping/>
+  </p:clrMapOvr>
+  <p:timing>
+    <p:tnLst>
+      <p:par>
+        <p:cTn id="1" dur="indefinite" restart="never" nodeType="tmRoot"/>
+      </p:par>
+    </p:tnLst>
+  </p:timing>
+</p:sld>
+</file>
+
+<file path=ppt/slides/slide34.xml><?xml version="1.0" encoding="utf-8"?>
+<p:sld xmlns:a="http://schemas.openxmlformats.org/drawingml/2006/main" xmlns:r="http://schemas.openxmlformats.org/officeDocument/2006/relationships" xmlns:p="http://schemas.openxmlformats.org/presentationml/2006/main">
+  <p:cSld>
+    <p:spTree>
+      <p:nvGrpSpPr>
+        <p:cNvPr id="1" name=""/>
+        <p:cNvGrpSpPr/>
+        <p:nvPr/>
+      </p:nvGrpSpPr>
+      <p:grpSpPr>
+        <a:xfrm>
+          <a:off x="0" y="0"/>
+          <a:ext cx="0" cy="0"/>
+          <a:chOff x="0" y="0"/>
+          <a:chExt cx="0" cy="0"/>
+        </a:xfrm>
+      </p:grpSpPr>
+      <p:sp>
+        <p:nvSpPr>
+          <p:cNvPr id="2" name="Title 1"/>
+          <p:cNvSpPr>
+            <a:spLocks noGrp="1"/>
+          </p:cNvSpPr>
+          <p:nvPr>
+            <p:ph type="title"/>
+          </p:nvPr>
+        </p:nvSpPr>
+        <p:spPr/>
+        <p:txBody>
+          <a:bodyPr/>
+          <a:lstStyle/>
+          <a:p>
+            <a:r>
+              <a:rPr lang="en-US" dirty="0" smtClean="0"/>
+              <a:t>Homework</a:t>
+            </a:r>
+            <a:endParaRPr lang="en-US" dirty="0"/>
+          </a:p>
+        </p:txBody>
+      </p:sp>
+      <p:sp>
+        <p:nvSpPr>
+          <p:cNvPr id="3" name="Content Placeholder 2"/>
+          <p:cNvSpPr>
+            <a:spLocks noGrp="1"/>
+          </p:cNvSpPr>
+          <p:nvPr>
+            <p:ph idx="1"/>
+          </p:nvPr>
+        </p:nvSpPr>
+        <p:spPr/>
+        <p:txBody>
+          <a:bodyPr>
+            <a:normAutofit fontScale="62500" lnSpcReduction="20000"/>
+          </a:bodyPr>
+          <a:lstStyle/>
+          <a:p>
+            <a:r>
+              <a:rPr lang="en-US" dirty="0" smtClean="0"/>
+              <a:t>SPOJ – </a:t>
+            </a:r>
+            <a:r>
+              <a:rPr lang="en-US" dirty="0"/>
+              <a:t>MSCHED</a:t>
+            </a:r>
+            <a:endParaRPr lang="en-US" dirty="0" smtClean="0"/>
+          </a:p>
+          <a:p>
+            <a:r>
+              <a:rPr lang="en-US" dirty="0" smtClean="0"/>
+              <a:t>Do the following:</a:t>
+            </a:r>
+          </a:p>
+          <a:p>
+            <a:pPr marL="857250" lvl="1" indent="-514350">
+              <a:buFont typeface="+mj-lt"/>
+              <a:buAutoNum type="arabicPeriod"/>
+            </a:pPr>
+            <a:r>
+              <a:rPr lang="en-US" dirty="0" smtClean="0"/>
+              <a:t>Explain the greedy choice needed</a:t>
+            </a:r>
+          </a:p>
+          <a:p>
+            <a:pPr marL="857250" lvl="1" indent="-514350">
+              <a:buFont typeface="+mj-lt"/>
+              <a:buAutoNum type="arabicPeriod"/>
+            </a:pPr>
+            <a:r>
+              <a:rPr lang="en-US" dirty="0" smtClean="0"/>
+              <a:t>Write down the algorithm (pseudocode): iterative greedy </a:t>
+            </a:r>
+            <a:r>
+              <a:rPr lang="en-US" dirty="0" smtClean="0">
+                <a:sym typeface="Wingdings" panose="05000000000000000000" pitchFamily="2" charset="2"/>
+              </a:rPr>
+              <a:t> also lines about read the input and print the </a:t>
+            </a:r>
+            <a:r>
+              <a:rPr lang="en-US" dirty="0" smtClean="0">
+                <a:sym typeface="Wingdings" panose="05000000000000000000" pitchFamily="2" charset="2"/>
+              </a:rPr>
+              <a:t>output</a:t>
+            </a:r>
+            <a:br>
+              <a:rPr lang="en-US" dirty="0" smtClean="0">
+                <a:sym typeface="Wingdings" panose="05000000000000000000" pitchFamily="2" charset="2"/>
+              </a:rPr>
+            </a:br>
+            <a:r>
+              <a:rPr lang="en-US" dirty="0" smtClean="0">
+                <a:sym typeface="Wingdings" panose="05000000000000000000" pitchFamily="2" charset="2"/>
+              </a:rPr>
+              <a:t>2 algorithms</a:t>
+            </a:r>
+            <a:endParaRPr lang="en-US" dirty="0" smtClean="0"/>
+          </a:p>
+          <a:p>
+            <a:pPr marL="857250" lvl="1" indent="-514350">
+              <a:buFont typeface="+mj-lt"/>
+              <a:buAutoNum type="arabicPeriod"/>
+            </a:pPr>
+            <a:r>
+              <a:rPr lang="en-US" dirty="0" smtClean="0"/>
+              <a:t>Implements into C/C++ </a:t>
+            </a:r>
+            <a:r>
+              <a:rPr lang="en-US" dirty="0" smtClean="0"/>
+              <a:t>programs </a:t>
+            </a:r>
+            <a:r>
+              <a:rPr lang="en-US" dirty="0" smtClean="0">
+                <a:sym typeface="Wingdings" panose="05000000000000000000" pitchFamily="2" charset="2"/>
+              </a:rPr>
+              <a:t> 2 program</a:t>
+            </a:r>
+            <a:endParaRPr lang="en-US" dirty="0" smtClean="0"/>
+          </a:p>
+          <a:p>
+            <a:pPr marL="857250" lvl="1" indent="-514350">
+              <a:buFont typeface="+mj-lt"/>
+              <a:buAutoNum type="arabicPeriod"/>
+            </a:pPr>
+            <a:r>
+              <a:rPr lang="en-US" dirty="0" smtClean="0"/>
+              <a:t>Screenshot the output on your computer</a:t>
+            </a:r>
+          </a:p>
+          <a:p>
+            <a:pPr marL="857250" lvl="1" indent="-514350">
+              <a:buFont typeface="+mj-lt"/>
+              <a:buAutoNum type="arabicPeriod"/>
+            </a:pPr>
+            <a:r>
+              <a:rPr lang="en-US" dirty="0" smtClean="0"/>
+              <a:t>Submit to SPOJ by using your </a:t>
+            </a:r>
+            <a:r>
+              <a:rPr lang="en-US" smtClean="0"/>
+              <a:t>own </a:t>
+            </a:r>
+            <a:r>
+              <a:rPr lang="en-US" smtClean="0"/>
+              <a:t>account </a:t>
+            </a:r>
+            <a:r>
+              <a:rPr lang="en-US" smtClean="0">
+                <a:sym typeface="Wingdings" panose="05000000000000000000" pitchFamily="2" charset="2"/>
+              </a:rPr>
+              <a:t> 2 source code</a:t>
+            </a:r>
+            <a:endParaRPr lang="en-US" dirty="0" smtClean="0"/>
+          </a:p>
+          <a:p>
+            <a:pPr marL="857250" lvl="1" indent="-514350">
+              <a:buFont typeface="+mj-lt"/>
+              <a:buAutoNum type="arabicPeriod"/>
+            </a:pPr>
+            <a:r>
+              <a:rPr lang="en-US" dirty="0" smtClean="0"/>
+              <a:t>Screenshot the verdict </a:t>
+            </a:r>
+            <a:r>
+              <a:rPr lang="en-US" dirty="0" smtClean="0">
+                <a:sym typeface="Wingdings" panose="05000000000000000000" pitchFamily="2" charset="2"/>
+              </a:rPr>
+              <a:t> 2 programs</a:t>
+            </a:r>
+            <a:endParaRPr lang="en-US" dirty="0" smtClean="0"/>
+          </a:p>
+          <a:p>
+            <a:r>
+              <a:rPr lang="en-US" dirty="0" smtClean="0"/>
+              <a:t>Hard copy </a:t>
+            </a:r>
+            <a:r>
+              <a:rPr lang="en-US" dirty="0" smtClean="0">
+                <a:sym typeface="Wingdings" panose="05000000000000000000" pitchFamily="2" charset="2"/>
+              </a:rPr>
+              <a:t> May, 9</a:t>
+            </a:r>
+            <a:r>
+              <a:rPr lang="en-US" baseline="30000" dirty="0" smtClean="0">
+                <a:sym typeface="Wingdings" panose="05000000000000000000" pitchFamily="2" charset="2"/>
+              </a:rPr>
+              <a:t>th</a:t>
+            </a:r>
+            <a:r>
+              <a:rPr lang="en-US" dirty="0" smtClean="0">
+                <a:sym typeface="Wingdings" panose="05000000000000000000" pitchFamily="2" charset="2"/>
+              </a:rPr>
+              <a:t> 2017</a:t>
+            </a:r>
+            <a:endParaRPr lang="en-US" dirty="0"/>
+          </a:p>
+        </p:txBody>
+      </p:sp>
+    </p:spTree>
+    <p:extLst>
+      <p:ext uri="{BB962C8B-B14F-4D97-AF65-F5344CB8AC3E}">
+        <p14:creationId xmlns:p14="http://schemas.microsoft.com/office/powerpoint/2010/main" val="1502072470"/>
+      </p:ext>
+    </p:extLst>
+  </p:cSld>
+  <p:clrMapOvr>
+    <a:masterClrMapping/>
+  </p:clrMapOvr>
+  <p:timing>
+    <p:tnLst>
+      <p:par>
+        <p:cTn id="1" dur="indefinite" restart="never" nodeType="tmRoot"/>
+      </p:par>
+    </p:tnLst>
+  </p:timing>
+</p:sld>
+</file>
+
+<file path=ppt/slides/slide35.xml><?xml version="1.0" encoding="utf-8"?>
 <p:sld xmlns:a="http://schemas.openxmlformats.org/drawingml/2006/main" xmlns:r="http://schemas.openxmlformats.org/officeDocument/2006/relationships" xmlns:p="http://schemas.openxmlformats.org/presentationml/2006/main">
   <p:cSld>
     <p:spTree>
@@ -21212,7 +22189,7 @@
                 </a:solidFill>
               </a:rPr>
               <a:pPr eaLnBrk="1" hangingPunct="1"/>
-              <a:t>32</a:t>
+              <a:t>35</a:t>
             </a:fld>
             <a:r>
               <a:rPr kumimoji="0" lang="en-US" altLang="zh-TW" sz="1400" dirty="0" smtClean="0">
@@ -21399,7 +22376,7 @@
           <a:graphicData uri="http://schemas.openxmlformats.org/presentationml/2006/ole">
             <mc:AlternateContent xmlns:mc="http://schemas.openxmlformats.org/markup-compatibility/2006">
               <mc:Choice xmlns:v="urn:schemas-microsoft-com:vml" Requires="v">
-                <p:oleObj spid="_x0000_s3107" name="方程式" r:id="rId3" imgW="419040" imgH="444240" progId="Equation.3">
+                <p:oleObj spid="_x0000_s3121" name="方程式" r:id="rId3" imgW="419040" imgH="444240" progId="Equation.3">
                   <p:embed/>
                 </p:oleObj>
               </mc:Choice>
@@ -21496,7 +22473,7 @@
 </p:sld>
 </file>
 
-<file path=ppt/slides/slide33.xml><?xml version="1.0" encoding="utf-8"?>
+<file path=ppt/slides/slide36.xml><?xml version="1.0" encoding="utf-8"?>
 <p:sld xmlns:a="http://schemas.openxmlformats.org/drawingml/2006/main" xmlns:r="http://schemas.openxmlformats.org/officeDocument/2006/relationships" xmlns:p="http://schemas.openxmlformats.org/presentationml/2006/main">
   <p:cSld>
     <p:spTree>
@@ -21680,7 +22657,7 @@
                 </a:solidFill>
               </a:rPr>
               <a:pPr eaLnBrk="1" hangingPunct="1"/>
-              <a:t>33</a:t>
+              <a:t>36</a:t>
             </a:fld>
             <a:r>
               <a:rPr kumimoji="0" lang="en-US" altLang="zh-TW" sz="1400" dirty="0" smtClean="0">
@@ -21815,7 +22792,7 @@
           <a:graphicData uri="http://schemas.openxmlformats.org/presentationml/2006/ole">
             <mc:AlternateContent xmlns:mc="http://schemas.openxmlformats.org/markup-compatibility/2006">
               <mc:Choice xmlns:v="urn:schemas-microsoft-com:vml" Requires="v">
-                <p:oleObj spid="_x0000_s4164" name="方程式" r:id="rId3" imgW="457200" imgH="444240" progId="Equation.3">
+                <p:oleObj spid="_x0000_s4192" name="方程式" r:id="rId3" imgW="457200" imgH="444240" progId="Equation.3">
                   <p:embed/>
                 </p:oleObj>
               </mc:Choice>
@@ -21910,7 +22887,7 @@
           <a:graphicData uri="http://schemas.openxmlformats.org/presentationml/2006/ole">
             <mc:AlternateContent xmlns:mc="http://schemas.openxmlformats.org/markup-compatibility/2006">
               <mc:Choice xmlns:v="urn:schemas-microsoft-com:vml" Requires="v">
-                <p:oleObj spid="_x0000_s4165" name="方程式" r:id="rId5" imgW="609480" imgH="457200" progId="Equation.3">
+                <p:oleObj spid="_x0000_s4193" name="方程式" r:id="rId5" imgW="609480" imgH="457200" progId="Equation.3">
                   <p:embed/>
                 </p:oleObj>
               </mc:Choice>
@@ -22007,7 +22984,7 @@
 </p:sld>
 </file>
 
-<file path=ppt/slides/slide34.xml><?xml version="1.0" encoding="utf-8"?>
+<file path=ppt/slides/slide37.xml><?xml version="1.0" encoding="utf-8"?>
 <p:sld xmlns:a="http://schemas.openxmlformats.org/drawingml/2006/main" xmlns:r="http://schemas.openxmlformats.org/officeDocument/2006/relationships" xmlns:p="http://schemas.openxmlformats.org/presentationml/2006/main">
   <p:cSld>
     <p:spTree>
@@ -22191,16 +23168,8 @@
                 </a:solidFill>
               </a:rPr>
               <a:pPr eaLnBrk="1" hangingPunct="1"/>
-              <a:t>34</a:t>
+              <a:t>37</a:t>
             </a:fld>
-            <a:r>
-              <a:rPr kumimoji="0" lang="en-US" altLang="zh-TW" sz="1400" dirty="0" smtClean="0">
-                <a:solidFill>
-                  <a:schemeClr val="accent1"/>
-                </a:solidFill>
-              </a:rPr>
-              <a:t>\</a:t>
-            </a:r>
             <a:endParaRPr kumimoji="0" lang="en-US" altLang="zh-TW" sz="1400" dirty="0">
               <a:solidFill>
                 <a:schemeClr val="accent1"/>
@@ -23478,7 +24447,7 @@
 </p:sld>
 </file>
 
-<file path=ppt/slides/slide35.xml><?xml version="1.0" encoding="utf-8"?>
+<file path=ppt/slides/slide38.xml><?xml version="1.0" encoding="utf-8"?>
 <p:sld xmlns:a="http://schemas.openxmlformats.org/drawingml/2006/main" xmlns:r="http://schemas.openxmlformats.org/officeDocument/2006/relationships" xmlns:p="http://schemas.openxmlformats.org/presentationml/2006/main">
   <p:cSld>
     <p:spTree>
@@ -23557,7 +24526,7 @@
 </p:sld>
 </file>
 
-<file path=ppt/slides/slide36.xml><?xml version="1.0" encoding="utf-8"?>
+<file path=ppt/slides/slide39.xml><?xml version="1.0" encoding="utf-8"?>
 <p:sld xmlns:a="http://schemas.openxmlformats.org/drawingml/2006/main" xmlns:r="http://schemas.openxmlformats.org/officeDocument/2006/relationships" xmlns:p="http://schemas.openxmlformats.org/presentationml/2006/main">
   <p:cSld>
     <p:spTree>
@@ -24017,7 +24986,7 @@
           <a:graphicData uri="http://schemas.openxmlformats.org/presentationml/2006/ole">
             <mc:AlternateContent xmlns:mc="http://schemas.openxmlformats.org/markup-compatibility/2006">
               <mc:Choice xmlns:v="urn:schemas-microsoft-com:vml" Requires="v">
-                <p:oleObj spid="_x0000_s5188" name="Equation" r:id="rId3" imgW="3340080" imgH="622080" progId="Equation.3">
+                <p:oleObj spid="_x0000_s5216" name="Equation" r:id="rId3" imgW="3340080" imgH="622080" progId="Equation.3">
                   <p:embed/>
                 </p:oleObj>
               </mc:Choice>
@@ -24116,7 +25085,7 @@
           <a:graphicData uri="http://schemas.openxmlformats.org/presentationml/2006/ole">
             <mc:AlternateContent xmlns:mc="http://schemas.openxmlformats.org/markup-compatibility/2006">
               <mc:Choice xmlns:v="urn:schemas-microsoft-com:vml" Requires="v">
-                <p:oleObj spid="_x0000_s5189" name="Equation" r:id="rId5" imgW="914400" imgH="622080" progId="Equation.3">
+                <p:oleObj spid="_x0000_s5217" name="Equation" r:id="rId5" imgW="914400" imgH="622080" progId="Equation.3">
                   <p:embed/>
                 </p:oleObj>
               </mc:Choice>
@@ -24213,7 +25182,327 @@
 </p:sld>
 </file>
 
-<file path=ppt/slides/slide37.xml><?xml version="1.0" encoding="utf-8"?>
+<file path=ppt/slides/slide4.xml><?xml version="1.0" encoding="utf-8"?>
+<p:sld xmlns:a="http://schemas.openxmlformats.org/drawingml/2006/main" xmlns:r="http://schemas.openxmlformats.org/officeDocument/2006/relationships" xmlns:p="http://schemas.openxmlformats.org/presentationml/2006/main">
+  <p:cSld>
+    <p:spTree>
+      <p:nvGrpSpPr>
+        <p:cNvPr id="1" name=""/>
+        <p:cNvGrpSpPr/>
+        <p:nvPr/>
+      </p:nvGrpSpPr>
+      <p:grpSpPr>
+        <a:xfrm>
+          <a:off x="0" y="0"/>
+          <a:ext cx="0" cy="0"/>
+          <a:chOff x="0" y="0"/>
+          <a:chExt cx="0" cy="0"/>
+        </a:xfrm>
+      </p:grpSpPr>
+      <p:sp>
+        <p:nvSpPr>
+          <p:cNvPr id="6146" name="Rectangle 2"/>
+          <p:cNvSpPr>
+            <a:spLocks noChangeArrowheads="1"/>
+          </p:cNvSpPr>
+          <p:nvPr/>
+        </p:nvSpPr>
+        <p:spPr bwMode="auto">
+          <a:xfrm>
+            <a:off x="685800" y="6248400"/>
+            <a:ext cx="1905000" cy="457200"/>
+          </a:xfrm>
+          <a:prstGeom prst="rect">
+            <a:avLst/>
+          </a:prstGeom>
+          <a:noFill/>
+          <a:ln>
+            <a:noFill/>
+          </a:ln>
+          <a:effectLst/>
+          <a:extLst>
+            <a:ext uri="{909E8E84-426E-40DD-AFC4-6F175D3DCCD1}">
+              <a14:hiddenFill xmlns:a14="http://schemas.microsoft.com/office/drawing/2010/main">
+                <a:solidFill>
+                  <a:schemeClr val="accent1"/>
+                </a:solidFill>
+              </a14:hiddenFill>
+            </a:ext>
+            <a:ext uri="{91240B29-F687-4F45-9708-019B960494DF}">
+              <a14:hiddenLine xmlns:a14="http://schemas.microsoft.com/office/drawing/2010/main" w="12700">
+                <a:solidFill>
+                  <a:srgbClr val="00FFFF"/>
+                </a:solidFill>
+                <a:miter lim="800000"/>
+                <a:headEnd/>
+                <a:tailEnd/>
+              </a14:hiddenLine>
+            </a:ext>
+            <a:ext uri="{AF507438-7753-43E0-B8FC-AC1667EBCBE1}">
+              <a14:hiddenEffects xmlns:a14="http://schemas.microsoft.com/office/drawing/2010/main">
+                <a:effectLst>
+                  <a:outerShdw dist="35921" dir="2700000" algn="ctr" rotWithShape="0">
+                    <a:schemeClr val="bg2"/>
+                  </a:outerShdw>
+                </a:effectLst>
+              </a14:hiddenEffects>
+            </a:ext>
+          </a:extLst>
+        </p:spPr>
+        <p:txBody>
+          <a:bodyPr wrap="none" anchor="ctr"/>
+          <a:lstStyle/>
+          <a:p>
+            <a:endParaRPr lang="en-US"/>
+          </a:p>
+        </p:txBody>
+      </p:sp>
+      <p:sp>
+        <p:nvSpPr>
+          <p:cNvPr id="6147" name="Rectangle 3"/>
+          <p:cNvSpPr>
+            <a:spLocks noChangeArrowheads="1"/>
+          </p:cNvSpPr>
+          <p:nvPr/>
+        </p:nvSpPr>
+        <p:spPr bwMode="auto">
+          <a:xfrm>
+            <a:off x="3124200" y="6248400"/>
+            <a:ext cx="2895600" cy="457200"/>
+          </a:xfrm>
+          <a:prstGeom prst="rect">
+            <a:avLst/>
+          </a:prstGeom>
+          <a:noFill/>
+          <a:ln>
+            <a:noFill/>
+          </a:ln>
+          <a:effectLst/>
+          <a:extLst>
+            <a:ext uri="{909E8E84-426E-40DD-AFC4-6F175D3DCCD1}">
+              <a14:hiddenFill xmlns:a14="http://schemas.microsoft.com/office/drawing/2010/main">
+                <a:solidFill>
+                  <a:schemeClr val="accent1"/>
+                </a:solidFill>
+              </a14:hiddenFill>
+            </a:ext>
+            <a:ext uri="{91240B29-F687-4F45-9708-019B960494DF}">
+              <a14:hiddenLine xmlns:a14="http://schemas.microsoft.com/office/drawing/2010/main" w="12700">
+                <a:solidFill>
+                  <a:srgbClr val="00FFFF"/>
+                </a:solidFill>
+                <a:miter lim="800000"/>
+                <a:headEnd/>
+                <a:tailEnd/>
+              </a14:hiddenLine>
+            </a:ext>
+            <a:ext uri="{AF507438-7753-43E0-B8FC-AC1667EBCBE1}">
+              <a14:hiddenEffects xmlns:a14="http://schemas.microsoft.com/office/drawing/2010/main">
+                <a:effectLst>
+                  <a:outerShdw dist="35921" dir="2700000" algn="ctr" rotWithShape="0">
+                    <a:schemeClr val="bg2"/>
+                  </a:outerShdw>
+                </a:effectLst>
+              </a14:hiddenEffects>
+            </a:ext>
+          </a:extLst>
+        </p:spPr>
+        <p:txBody>
+          <a:bodyPr wrap="none" anchor="ctr"/>
+          <a:lstStyle/>
+          <a:p>
+            <a:endParaRPr lang="en-US"/>
+          </a:p>
+        </p:txBody>
+      </p:sp>
+      <p:sp>
+        <p:nvSpPr>
+          <p:cNvPr id="6148" name="Rectangle 4"/>
+          <p:cNvSpPr>
+            <a:spLocks noGrp="1" noChangeArrowheads="1"/>
+          </p:cNvSpPr>
+          <p:nvPr>
+            <p:ph type="title"/>
+          </p:nvPr>
+        </p:nvSpPr>
+        <p:spPr>
+          <a:xfrm>
+            <a:off x="628650" y="327025"/>
+            <a:ext cx="7793038" cy="762000"/>
+          </a:xfrm>
+          <a:noFill/>
+          <a:ln/>
+          <a:extLst>
+            <a:ext uri="{91240B29-F687-4F45-9708-019B960494DF}">
+              <a14:hiddenLine xmlns:a14="http://schemas.microsoft.com/office/drawing/2010/main" w="12700">
+                <a:solidFill>
+                  <a:schemeClr val="tx1"/>
+                </a:solidFill>
+                <a:miter lim="800000"/>
+                <a:headEnd/>
+                <a:tailEnd/>
+              </a14:hiddenLine>
+            </a:ext>
+          </a:extLst>
+        </p:spPr>
+        <p:txBody>
+          <a:bodyPr lIns="90488" tIns="44450" rIns="90488" bIns="44450" anchor="ctr"/>
+          <a:lstStyle/>
+          <a:p>
+            <a:r>
+              <a:rPr lang="en-US" dirty="0"/>
+              <a:t>Optimization problems</a:t>
+            </a:r>
+          </a:p>
+        </p:txBody>
+      </p:sp>
+      <p:sp>
+        <p:nvSpPr>
+          <p:cNvPr id="6149" name="Rectangle 5"/>
+          <p:cNvSpPr>
+            <a:spLocks noGrp="1" noChangeArrowheads="1"/>
+          </p:cNvSpPr>
+          <p:nvPr>
+            <p:ph type="body" idx="1"/>
+          </p:nvPr>
+        </p:nvSpPr>
+        <p:spPr>
+          <a:xfrm>
+            <a:off x="685800" y="1524000"/>
+            <a:ext cx="7772400" cy="4953000"/>
+          </a:xfrm>
+          <a:noFill/>
+          <a:ln/>
+          <a:extLst>
+            <a:ext uri="{91240B29-F687-4F45-9708-019B960494DF}">
+              <a14:hiddenLine xmlns:a14="http://schemas.microsoft.com/office/drawing/2010/main" w="12700">
+                <a:solidFill>
+                  <a:schemeClr val="tx1"/>
+                </a:solidFill>
+                <a:miter lim="800000"/>
+                <a:headEnd/>
+                <a:tailEnd/>
+              </a14:hiddenLine>
+            </a:ext>
+          </a:extLst>
+        </p:spPr>
+        <p:txBody>
+          <a:bodyPr lIns="90488" tIns="44450" rIns="90488" bIns="44450">
+            <a:normAutofit fontScale="77500" lnSpcReduction="20000"/>
+          </a:bodyPr>
+          <a:lstStyle/>
+          <a:p>
+            <a:r>
+              <a:rPr lang="en-US" dirty="0"/>
+              <a:t>An </a:t>
+            </a:r>
+            <a:r>
+              <a:rPr lang="en-US" dirty="0">
+                <a:solidFill>
+                  <a:schemeClr val="tx2"/>
+                </a:solidFill>
+              </a:rPr>
+              <a:t>optimization problem</a:t>
+            </a:r>
+            <a:r>
+              <a:rPr lang="en-US" dirty="0"/>
+              <a:t> is one in which you want to find, not just </a:t>
+            </a:r>
+            <a:r>
+              <a:rPr lang="en-US" i="1" dirty="0"/>
+              <a:t>a</a:t>
+            </a:r>
+            <a:r>
+              <a:rPr lang="en-US" dirty="0"/>
+              <a:t> solution, but the </a:t>
+            </a:r>
+            <a:r>
+              <a:rPr lang="en-US" i="1" dirty="0"/>
+              <a:t>best</a:t>
+            </a:r>
+            <a:r>
+              <a:rPr lang="en-US" dirty="0"/>
+              <a:t> solution</a:t>
+            </a:r>
+          </a:p>
+          <a:p>
+            <a:r>
+              <a:rPr lang="en-US" dirty="0"/>
+              <a:t>A “greedy algorithm” sometimes works well for optimization problems</a:t>
+            </a:r>
+          </a:p>
+          <a:p>
+            <a:r>
+              <a:rPr lang="en-US" dirty="0"/>
+              <a:t>A </a:t>
+            </a:r>
+            <a:r>
+              <a:rPr lang="en-US" dirty="0">
+                <a:solidFill>
+                  <a:schemeClr val="tx2"/>
+                </a:solidFill>
+              </a:rPr>
+              <a:t>greedy algorithm</a:t>
+            </a:r>
+            <a:r>
+              <a:rPr lang="en-US" dirty="0"/>
+              <a:t> works in phases. At each phase:</a:t>
+            </a:r>
+          </a:p>
+          <a:p>
+            <a:pPr lvl="1"/>
+            <a:r>
+              <a:rPr lang="en-US" dirty="0"/>
+              <a:t>You take the best you can get right now, without regard for future consequences</a:t>
+            </a:r>
+          </a:p>
+          <a:p>
+            <a:pPr lvl="1"/>
+            <a:r>
+              <a:rPr lang="en-US" dirty="0"/>
+              <a:t>You hope that by choosing a </a:t>
+            </a:r>
+            <a:r>
+              <a:rPr lang="en-US" i="1" dirty="0"/>
+              <a:t>local</a:t>
+            </a:r>
+            <a:r>
+              <a:rPr lang="en-US" dirty="0"/>
+              <a:t> optimum at each step, you will end up at a </a:t>
+            </a:r>
+            <a:r>
+              <a:rPr lang="en-US" i="1" dirty="0"/>
+              <a:t>global</a:t>
+            </a:r>
+            <a:r>
+              <a:rPr lang="en-US" dirty="0"/>
+              <a:t> optimum</a:t>
+            </a:r>
+          </a:p>
+        </p:txBody>
+      </p:sp>
+    </p:spTree>
+    <p:extLst>
+      <p:ext uri="{BB962C8B-B14F-4D97-AF65-F5344CB8AC3E}">
+        <p14:creationId xmlns:p14="http://schemas.microsoft.com/office/powerpoint/2010/main" val="536542080"/>
+      </p:ext>
+    </p:extLst>
+  </p:cSld>
+  <p:clrMapOvr>
+    <a:masterClrMapping/>
+  </p:clrMapOvr>
+  <p:transition spd="slow"/>
+  <p:timing>
+    <p:tnLst>
+      <p:par>
+        <p:cTn id="1" dur="indefinite" restart="never" nodeType="tmRoot"/>
+      </p:par>
+    </p:tnLst>
+  </p:timing>
+</p:sld>
+</file>
+
+<file path=ppt/slides/slide40.xml><?xml version="1.0" encoding="utf-8"?>
 <p:sld xmlns:a="http://schemas.openxmlformats.org/drawingml/2006/main" xmlns:r="http://schemas.openxmlformats.org/officeDocument/2006/relationships" xmlns:p="http://schemas.openxmlformats.org/presentationml/2006/main">
   <p:cSld>
     <p:spTree>
@@ -25346,7 +26635,7 @@
 </p:sld>
 </file>
 
-<file path=ppt/slides/slide38.xml><?xml version="1.0" encoding="utf-8"?>
+<file path=ppt/slides/slide41.xml><?xml version="1.0" encoding="utf-8"?>
 <p:sld xmlns:a="http://schemas.openxmlformats.org/drawingml/2006/main" xmlns:r="http://schemas.openxmlformats.org/officeDocument/2006/relationships" xmlns:p="http://schemas.openxmlformats.org/presentationml/2006/main">
   <p:cSld>
     <p:spTree>
@@ -26221,7 +27510,7 @@
           <a:graphicData uri="http://schemas.openxmlformats.org/presentationml/2006/ole">
             <mc:AlternateContent xmlns:mc="http://schemas.openxmlformats.org/markup-compatibility/2006">
               <mc:Choice xmlns:v="urn:schemas-microsoft-com:vml" Requires="v">
-                <p:oleObj spid="_x0000_s6179" name="Equation" r:id="rId3" imgW="3340080" imgH="622080" progId="Equation.3">
+                <p:oleObj spid="_x0000_s6193" name="Equation" r:id="rId3" imgW="3340080" imgH="622080" progId="Equation.3">
                   <p:embed/>
                 </p:oleObj>
               </mc:Choice>
@@ -26308,326 +27597,6 @@
   <p:clrMapOvr>
     <a:masterClrMapping/>
   </p:clrMapOvr>
-  <p:timing>
-    <p:tnLst>
-      <p:par>
-        <p:cTn id="1" dur="indefinite" restart="never" nodeType="tmRoot"/>
-      </p:par>
-    </p:tnLst>
-  </p:timing>
-</p:sld>
-</file>
-
-<file path=ppt/slides/slide4.xml><?xml version="1.0" encoding="utf-8"?>
-<p:sld xmlns:a="http://schemas.openxmlformats.org/drawingml/2006/main" xmlns:r="http://schemas.openxmlformats.org/officeDocument/2006/relationships" xmlns:p="http://schemas.openxmlformats.org/presentationml/2006/main">
-  <p:cSld>
-    <p:spTree>
-      <p:nvGrpSpPr>
-        <p:cNvPr id="1" name=""/>
-        <p:cNvGrpSpPr/>
-        <p:nvPr/>
-      </p:nvGrpSpPr>
-      <p:grpSpPr>
-        <a:xfrm>
-          <a:off x="0" y="0"/>
-          <a:ext cx="0" cy="0"/>
-          <a:chOff x="0" y="0"/>
-          <a:chExt cx="0" cy="0"/>
-        </a:xfrm>
-      </p:grpSpPr>
-      <p:sp>
-        <p:nvSpPr>
-          <p:cNvPr id="6146" name="Rectangle 2"/>
-          <p:cNvSpPr>
-            <a:spLocks noChangeArrowheads="1"/>
-          </p:cNvSpPr>
-          <p:nvPr/>
-        </p:nvSpPr>
-        <p:spPr bwMode="auto">
-          <a:xfrm>
-            <a:off x="685800" y="6248400"/>
-            <a:ext cx="1905000" cy="457200"/>
-          </a:xfrm>
-          <a:prstGeom prst="rect">
-            <a:avLst/>
-          </a:prstGeom>
-          <a:noFill/>
-          <a:ln>
-            <a:noFill/>
-          </a:ln>
-          <a:effectLst/>
-          <a:extLst>
-            <a:ext uri="{909E8E84-426E-40DD-AFC4-6F175D3DCCD1}">
-              <a14:hiddenFill xmlns:a14="http://schemas.microsoft.com/office/drawing/2010/main">
-                <a:solidFill>
-                  <a:schemeClr val="accent1"/>
-                </a:solidFill>
-              </a14:hiddenFill>
-            </a:ext>
-            <a:ext uri="{91240B29-F687-4F45-9708-019B960494DF}">
-              <a14:hiddenLine xmlns:a14="http://schemas.microsoft.com/office/drawing/2010/main" w="12700">
-                <a:solidFill>
-                  <a:srgbClr val="00FFFF"/>
-                </a:solidFill>
-                <a:miter lim="800000"/>
-                <a:headEnd/>
-                <a:tailEnd/>
-              </a14:hiddenLine>
-            </a:ext>
-            <a:ext uri="{AF507438-7753-43E0-B8FC-AC1667EBCBE1}">
-              <a14:hiddenEffects xmlns:a14="http://schemas.microsoft.com/office/drawing/2010/main">
-                <a:effectLst>
-                  <a:outerShdw dist="35921" dir="2700000" algn="ctr" rotWithShape="0">
-                    <a:schemeClr val="bg2"/>
-                  </a:outerShdw>
-                </a:effectLst>
-              </a14:hiddenEffects>
-            </a:ext>
-          </a:extLst>
-        </p:spPr>
-        <p:txBody>
-          <a:bodyPr wrap="none" anchor="ctr"/>
-          <a:lstStyle/>
-          <a:p>
-            <a:endParaRPr lang="en-US"/>
-          </a:p>
-        </p:txBody>
-      </p:sp>
-      <p:sp>
-        <p:nvSpPr>
-          <p:cNvPr id="6147" name="Rectangle 3"/>
-          <p:cNvSpPr>
-            <a:spLocks noChangeArrowheads="1"/>
-          </p:cNvSpPr>
-          <p:nvPr/>
-        </p:nvSpPr>
-        <p:spPr bwMode="auto">
-          <a:xfrm>
-            <a:off x="3124200" y="6248400"/>
-            <a:ext cx="2895600" cy="457200"/>
-          </a:xfrm>
-          <a:prstGeom prst="rect">
-            <a:avLst/>
-          </a:prstGeom>
-          <a:noFill/>
-          <a:ln>
-            <a:noFill/>
-          </a:ln>
-          <a:effectLst/>
-          <a:extLst>
-            <a:ext uri="{909E8E84-426E-40DD-AFC4-6F175D3DCCD1}">
-              <a14:hiddenFill xmlns:a14="http://schemas.microsoft.com/office/drawing/2010/main">
-                <a:solidFill>
-                  <a:schemeClr val="accent1"/>
-                </a:solidFill>
-              </a14:hiddenFill>
-            </a:ext>
-            <a:ext uri="{91240B29-F687-4F45-9708-019B960494DF}">
-              <a14:hiddenLine xmlns:a14="http://schemas.microsoft.com/office/drawing/2010/main" w="12700">
-                <a:solidFill>
-                  <a:srgbClr val="00FFFF"/>
-                </a:solidFill>
-                <a:miter lim="800000"/>
-                <a:headEnd/>
-                <a:tailEnd/>
-              </a14:hiddenLine>
-            </a:ext>
-            <a:ext uri="{AF507438-7753-43E0-B8FC-AC1667EBCBE1}">
-              <a14:hiddenEffects xmlns:a14="http://schemas.microsoft.com/office/drawing/2010/main">
-                <a:effectLst>
-                  <a:outerShdw dist="35921" dir="2700000" algn="ctr" rotWithShape="0">
-                    <a:schemeClr val="bg2"/>
-                  </a:outerShdw>
-                </a:effectLst>
-              </a14:hiddenEffects>
-            </a:ext>
-          </a:extLst>
-        </p:spPr>
-        <p:txBody>
-          <a:bodyPr wrap="none" anchor="ctr"/>
-          <a:lstStyle/>
-          <a:p>
-            <a:endParaRPr lang="en-US"/>
-          </a:p>
-        </p:txBody>
-      </p:sp>
-      <p:sp>
-        <p:nvSpPr>
-          <p:cNvPr id="6148" name="Rectangle 4"/>
-          <p:cNvSpPr>
-            <a:spLocks noGrp="1" noChangeArrowheads="1"/>
-          </p:cNvSpPr>
-          <p:nvPr>
-            <p:ph type="title"/>
-          </p:nvPr>
-        </p:nvSpPr>
-        <p:spPr>
-          <a:xfrm>
-            <a:off x="628650" y="327025"/>
-            <a:ext cx="7793038" cy="762000"/>
-          </a:xfrm>
-          <a:noFill/>
-          <a:ln/>
-          <a:extLst>
-            <a:ext uri="{91240B29-F687-4F45-9708-019B960494DF}">
-              <a14:hiddenLine xmlns:a14="http://schemas.microsoft.com/office/drawing/2010/main" w="12700">
-                <a:solidFill>
-                  <a:schemeClr val="tx1"/>
-                </a:solidFill>
-                <a:miter lim="800000"/>
-                <a:headEnd/>
-                <a:tailEnd/>
-              </a14:hiddenLine>
-            </a:ext>
-          </a:extLst>
-        </p:spPr>
-        <p:txBody>
-          <a:bodyPr lIns="90488" tIns="44450" rIns="90488" bIns="44450" anchor="ctr"/>
-          <a:lstStyle/>
-          <a:p>
-            <a:r>
-              <a:rPr lang="en-US" dirty="0"/>
-              <a:t>Optimization problems</a:t>
-            </a:r>
-          </a:p>
-        </p:txBody>
-      </p:sp>
-      <p:sp>
-        <p:nvSpPr>
-          <p:cNvPr id="6149" name="Rectangle 5"/>
-          <p:cNvSpPr>
-            <a:spLocks noGrp="1" noChangeArrowheads="1"/>
-          </p:cNvSpPr>
-          <p:nvPr>
-            <p:ph type="body" idx="1"/>
-          </p:nvPr>
-        </p:nvSpPr>
-        <p:spPr>
-          <a:xfrm>
-            <a:off x="685800" y="1524000"/>
-            <a:ext cx="7772400" cy="4953000"/>
-          </a:xfrm>
-          <a:noFill/>
-          <a:ln/>
-          <a:extLst>
-            <a:ext uri="{91240B29-F687-4F45-9708-019B960494DF}">
-              <a14:hiddenLine xmlns:a14="http://schemas.microsoft.com/office/drawing/2010/main" w="12700">
-                <a:solidFill>
-                  <a:schemeClr val="tx1"/>
-                </a:solidFill>
-                <a:miter lim="800000"/>
-                <a:headEnd/>
-                <a:tailEnd/>
-              </a14:hiddenLine>
-            </a:ext>
-          </a:extLst>
-        </p:spPr>
-        <p:txBody>
-          <a:bodyPr lIns="90488" tIns="44450" rIns="90488" bIns="44450">
-            <a:normAutofit fontScale="77500" lnSpcReduction="20000"/>
-          </a:bodyPr>
-          <a:lstStyle/>
-          <a:p>
-            <a:r>
-              <a:rPr lang="en-US" dirty="0"/>
-              <a:t>An </a:t>
-            </a:r>
-            <a:r>
-              <a:rPr lang="en-US" dirty="0">
-                <a:solidFill>
-                  <a:schemeClr val="tx2"/>
-                </a:solidFill>
-              </a:rPr>
-              <a:t>optimization problem</a:t>
-            </a:r>
-            <a:r>
-              <a:rPr lang="en-US" dirty="0"/>
-              <a:t> is one in which you want to find, not just </a:t>
-            </a:r>
-            <a:r>
-              <a:rPr lang="en-US" i="1" dirty="0"/>
-              <a:t>a</a:t>
-            </a:r>
-            <a:r>
-              <a:rPr lang="en-US" dirty="0"/>
-              <a:t> solution, but the </a:t>
-            </a:r>
-            <a:r>
-              <a:rPr lang="en-US" i="1" dirty="0"/>
-              <a:t>best</a:t>
-            </a:r>
-            <a:r>
-              <a:rPr lang="en-US" dirty="0"/>
-              <a:t> solution</a:t>
-            </a:r>
-          </a:p>
-          <a:p>
-            <a:r>
-              <a:rPr lang="en-US" dirty="0"/>
-              <a:t>A “greedy algorithm” sometimes works well for optimization problems</a:t>
-            </a:r>
-          </a:p>
-          <a:p>
-            <a:r>
-              <a:rPr lang="en-US" dirty="0"/>
-              <a:t>A </a:t>
-            </a:r>
-            <a:r>
-              <a:rPr lang="en-US" dirty="0">
-                <a:solidFill>
-                  <a:schemeClr val="tx2"/>
-                </a:solidFill>
-              </a:rPr>
-              <a:t>greedy algorithm</a:t>
-            </a:r>
-            <a:r>
-              <a:rPr lang="en-US" dirty="0"/>
-              <a:t> works in phases. At each phase:</a:t>
-            </a:r>
-          </a:p>
-          <a:p>
-            <a:pPr lvl="1"/>
-            <a:r>
-              <a:rPr lang="en-US" dirty="0"/>
-              <a:t>You take the best you can get right now, without regard for future consequences</a:t>
-            </a:r>
-          </a:p>
-          <a:p>
-            <a:pPr lvl="1"/>
-            <a:r>
-              <a:rPr lang="en-US" dirty="0"/>
-              <a:t>You hope that by choosing a </a:t>
-            </a:r>
-            <a:r>
-              <a:rPr lang="en-US" i="1" dirty="0"/>
-              <a:t>local</a:t>
-            </a:r>
-            <a:r>
-              <a:rPr lang="en-US" dirty="0"/>
-              <a:t> optimum at each step, you will end up at a </a:t>
-            </a:r>
-            <a:r>
-              <a:rPr lang="en-US" i="1" dirty="0"/>
-              <a:t>global</a:t>
-            </a:r>
-            <a:r>
-              <a:rPr lang="en-US" dirty="0"/>
-              <a:t> optimum</a:t>
-            </a:r>
-          </a:p>
-        </p:txBody>
-      </p:sp>
-    </p:spTree>
-    <p:extLst>
-      <p:ext uri="{BB962C8B-B14F-4D97-AF65-F5344CB8AC3E}">
-        <p14:creationId xmlns:p14="http://schemas.microsoft.com/office/powerpoint/2010/main" val="536542080"/>
-      </p:ext>
-    </p:extLst>
-  </p:cSld>
-  <p:clrMapOvr>
-    <a:masterClrMapping/>
-  </p:clrMapOvr>
-  <p:transition spd="slow"/>
   <p:timing>
     <p:tnLst>
       <p:par>

</xml_diff>

<commit_message>
Updating optimum storage and knapsack greedy problem
</commit_message>
<xml_diff>
--- a/161702/presentation/10 - Greedy Algorithm 2/10. Greedy Algorithm (2).pptx
+++ b/161702/presentation/10 - Greedy Algorithm 2/10. Greedy Algorithm (2).pptx
@@ -5,7 +5,7 @@
     <p:sldMasterId id="2147483672" r:id="rId1"/>
   </p:sldMasterIdLst>
   <p:notesMasterIdLst>
-    <p:notesMasterId r:id="rId43"/>
+    <p:notesMasterId r:id="rId47"/>
   </p:notesMasterIdLst>
   <p:sldIdLst>
     <p:sldId id="256" r:id="rId2"/>
@@ -46,9 +46,13 @@
     <p:sldId id="284" r:id="rId37"/>
     <p:sldId id="285" r:id="rId38"/>
     <p:sldId id="262" r:id="rId39"/>
-    <p:sldId id="278" r:id="rId40"/>
-    <p:sldId id="279" r:id="rId41"/>
-    <p:sldId id="280" r:id="rId42"/>
+    <p:sldId id="310" r:id="rId40"/>
+    <p:sldId id="309" r:id="rId41"/>
+    <p:sldId id="278" r:id="rId42"/>
+    <p:sldId id="279" r:id="rId43"/>
+    <p:sldId id="280" r:id="rId44"/>
+    <p:sldId id="311" r:id="rId45"/>
+    <p:sldId id="312" r:id="rId46"/>
   </p:sldIdLst>
   <p:sldSz cx="9144000" cy="6858000" type="screen4x3"/>
   <p:notesSz cx="6858000" cy="9144000"/>
@@ -237,7 +241,7 @@
           <a:p>
             <a:fld id="{5939F4E3-8BDD-4AA5-AC28-DFF8CE22DD48}" type="datetimeFigureOut">
               <a:rPr lang="en-US" smtClean="0"/>
-              <a:t>5/2/2017</a:t>
+              <a:t>5/9/2017</a:t>
             </a:fld>
             <a:endParaRPr lang="en-US"/>
           </a:p>
@@ -2484,7 +2488,7 @@
           <a:p>
             <a:fld id="{EEC58B07-EB7E-44AD-A74F-F52443C83A19}" type="datetimeFigureOut">
               <a:rPr lang="en-US" smtClean="0"/>
-              <a:t>5/2/2017</a:t>
+              <a:t>5/9/2017</a:t>
             </a:fld>
             <a:endParaRPr lang="en-US"/>
           </a:p>
@@ -2662,7 +2666,7 @@
           <a:p>
             <a:fld id="{EEC58B07-EB7E-44AD-A74F-F52443C83A19}" type="datetimeFigureOut">
               <a:rPr lang="en-US" smtClean="0"/>
-              <a:t>5/2/2017</a:t>
+              <a:t>5/9/2017</a:t>
             </a:fld>
             <a:endParaRPr lang="en-US"/>
           </a:p>
@@ -2842,7 +2846,7 @@
           <a:p>
             <a:fld id="{EEC58B07-EB7E-44AD-A74F-F52443C83A19}" type="datetimeFigureOut">
               <a:rPr lang="en-US" smtClean="0"/>
-              <a:t>5/2/2017</a:t>
+              <a:t>5/9/2017</a:t>
             </a:fld>
             <a:endParaRPr lang="en-US"/>
           </a:p>
@@ -3086,7 +3090,7 @@
             <a:fld id="{E22EDF8C-5B3B-445A-AF06-0E8B295A5406}" type="datetime1">
               <a:rPr lang="zh-TW" altLang="en-US"/>
               <a:pPr/>
-              <a:t>2017/5/2</a:t>
+              <a:t>2017/5/9</a:t>
             </a:fld>
             <a:endParaRPr lang="en-US" altLang="zh-TW"/>
           </a:p>
@@ -3408,7 +3412,7 @@
             <a:fld id="{320B7D7E-A39D-4478-B1D4-9E28DF41077B}" type="datetime1">
               <a:rPr lang="zh-TW" altLang="en-US"/>
               <a:pPr/>
-              <a:t>2017/5/2</a:t>
+              <a:t>2017/5/9</a:t>
             </a:fld>
             <a:endParaRPr lang="en-US" altLang="zh-TW"/>
           </a:p>
@@ -3640,7 +3644,7 @@
           <a:p>
             <a:fld id="{EEC58B07-EB7E-44AD-A74F-F52443C83A19}" type="datetimeFigureOut">
               <a:rPr lang="en-US" smtClean="0"/>
-              <a:t>5/2/2017</a:t>
+              <a:t>5/9/2017</a:t>
             </a:fld>
             <a:endParaRPr lang="en-US"/>
           </a:p>
@@ -3890,7 +3894,7 @@
           <a:p>
             <a:fld id="{EEC58B07-EB7E-44AD-A74F-F52443C83A19}" type="datetimeFigureOut">
               <a:rPr lang="en-US" smtClean="0"/>
-              <a:t>5/2/2017</a:t>
+              <a:t>5/9/2017</a:t>
             </a:fld>
             <a:endParaRPr lang="en-US"/>
           </a:p>
@@ -4130,7 +4134,7 @@
           <a:p>
             <a:fld id="{EEC58B07-EB7E-44AD-A74F-F52443C83A19}" type="datetimeFigureOut">
               <a:rPr lang="en-US" smtClean="0"/>
-              <a:t>5/2/2017</a:t>
+              <a:t>5/9/2017</a:t>
             </a:fld>
             <a:endParaRPr lang="en-US"/>
           </a:p>
@@ -4505,7 +4509,7 @@
           <a:p>
             <a:fld id="{EEC58B07-EB7E-44AD-A74F-F52443C83A19}" type="datetimeFigureOut">
               <a:rPr lang="en-US" smtClean="0"/>
-              <a:t>5/2/2017</a:t>
+              <a:t>5/9/2017</a:t>
             </a:fld>
             <a:endParaRPr lang="en-US"/>
           </a:p>
@@ -4631,7 +4635,7 @@
           <a:p>
             <a:fld id="{EEC58B07-EB7E-44AD-A74F-F52443C83A19}" type="datetimeFigureOut">
               <a:rPr lang="en-US" smtClean="0"/>
-              <a:t>5/2/2017</a:t>
+              <a:t>5/9/2017</a:t>
             </a:fld>
             <a:endParaRPr lang="en-US"/>
           </a:p>
@@ -4726,7 +4730,7 @@
           <a:p>
             <a:fld id="{EEC58B07-EB7E-44AD-A74F-F52443C83A19}" type="datetimeFigureOut">
               <a:rPr lang="en-US" smtClean="0"/>
-              <a:t>5/2/2017</a:t>
+              <a:t>5/9/2017</a:t>
             </a:fld>
             <a:endParaRPr lang="en-US"/>
           </a:p>
@@ -5003,7 +5007,7 @@
           <a:p>
             <a:fld id="{EEC58B07-EB7E-44AD-A74F-F52443C83A19}" type="datetimeFigureOut">
               <a:rPr lang="en-US" smtClean="0"/>
-              <a:t>5/2/2017</a:t>
+              <a:t>5/9/2017</a:t>
             </a:fld>
             <a:endParaRPr lang="en-US"/>
           </a:p>
@@ -5260,7 +5264,7 @@
           <a:p>
             <a:fld id="{EEC58B07-EB7E-44AD-A74F-F52443C83A19}" type="datetimeFigureOut">
               <a:rPr lang="en-US" smtClean="0"/>
-              <a:t>5/2/2017</a:t>
+              <a:t>5/9/2017</a:t>
             </a:fld>
             <a:endParaRPr lang="en-US"/>
           </a:p>
@@ -5473,7 +5477,7 @@
           <a:p>
             <a:fld id="{EEC58B07-EB7E-44AD-A74F-F52443C83A19}" type="datetimeFigureOut">
               <a:rPr lang="en-US" smtClean="0"/>
-              <a:t>5/2/2017</a:t>
+              <a:t>5/9/2017</a:t>
             </a:fld>
             <a:endParaRPr lang="en-US"/>
           </a:p>
@@ -18287,7 +18291,7 @@
           <a:graphicData uri="http://schemas.openxmlformats.org/presentationml/2006/ole">
             <mc:AlternateContent xmlns:mc="http://schemas.openxmlformats.org/markup-compatibility/2006">
               <mc:Choice xmlns:v="urn:schemas-microsoft-com:vml" Requires="v">
-                <p:oleObj spid="_x0000_s2098" name="方程式" r:id="rId3" imgW="469800" imgH="266400" progId="Equation.3">
+                <p:oleObj spid="_x0000_s2112" name="方程式" r:id="rId3" imgW="469800" imgH="266400" progId="Equation.3">
                   <p:embed/>
                 </p:oleObj>
               </mc:Choice>
@@ -19003,11 +19007,11 @@
   <p:clrMapOvr>
     <a:masterClrMapping/>
   </p:clrMapOvr>
-  <mc:AlternateContent xmlns:mc="http://schemas.openxmlformats.org/markup-compatibility/2006">
-    <mc:Choice xmlns:p14="http://schemas.microsoft.com/office/powerpoint/2010/main" Requires="p14">
+  <mc:AlternateContent xmlns:mc="http://schemas.openxmlformats.org/markup-compatibility/2006" xmlns:p14="http://schemas.microsoft.com/office/powerpoint/2010/main">
+    <mc:Choice Requires="p14">
       <p:transition spd="slow" p14:dur="2000"/>
     </mc:Choice>
-    <mc:Fallback>
+    <mc:Fallback xmlns="">
       <p:transition spd="slow"/>
     </mc:Fallback>
   </mc:AlternateContent>
@@ -19137,11 +19141,11 @@
   <p:clrMapOvr>
     <a:masterClrMapping/>
   </p:clrMapOvr>
-  <mc:AlternateContent xmlns:mc="http://schemas.openxmlformats.org/markup-compatibility/2006">
-    <mc:Choice xmlns:p14="http://schemas.microsoft.com/office/powerpoint/2010/main" Requires="p14">
+  <mc:AlternateContent xmlns:mc="http://schemas.openxmlformats.org/markup-compatibility/2006" xmlns:p14="http://schemas.microsoft.com/office/powerpoint/2010/main">
+    <mc:Choice Requires="p14">
       <p:transition spd="slow" p14:dur="2000"/>
     </mc:Choice>
-    <mc:Fallback>
+    <mc:Fallback xmlns="">
       <p:transition spd="slow"/>
     </mc:Fallback>
   </mc:AlternateContent>
@@ -21864,13 +21868,7 @@
               <a:rPr lang="en-US" dirty="0" smtClean="0">
                 <a:sym typeface="Wingdings" panose="05000000000000000000" pitchFamily="2" charset="2"/>
               </a:rPr>
-              <a:t> also lines about read the input and print the </a:t>
-            </a:r>
-            <a:r>
-              <a:rPr lang="en-US" dirty="0" smtClean="0">
-                <a:sym typeface="Wingdings" panose="05000000000000000000" pitchFamily="2" charset="2"/>
-              </a:rPr>
-              <a:t>output</a:t>
+              <a:t> also lines about read the input and print the output</a:t>
             </a:r>
             <a:br>
               <a:rPr lang="en-US" dirty="0" smtClean="0">
@@ -21892,11 +21890,7 @@
             </a:pPr>
             <a:r>
               <a:rPr lang="en-US" dirty="0" smtClean="0"/>
-              <a:t>Implements into C/C++ </a:t>
-            </a:r>
-            <a:r>
-              <a:rPr lang="en-US" dirty="0" smtClean="0"/>
-              <a:t>programs </a:t>
+              <a:t>Implements into C/C++ programs </a:t>
             </a:r>
             <a:r>
               <a:rPr lang="en-US" dirty="0" smtClean="0">
@@ -21927,11 +21921,7 @@
             </a:r>
             <a:r>
               <a:rPr lang="en-US" smtClean="0"/>
-              <a:t>own </a:t>
-            </a:r>
-            <a:r>
-              <a:rPr lang="en-US" smtClean="0"/>
-              <a:t>account </a:t>
+              <a:t>own account </a:t>
             </a:r>
             <a:r>
               <a:rPr lang="en-US" smtClean="0">
@@ -22376,7 +22366,7 @@
           <a:graphicData uri="http://schemas.openxmlformats.org/presentationml/2006/ole">
             <mc:AlternateContent xmlns:mc="http://schemas.openxmlformats.org/markup-compatibility/2006">
               <mc:Choice xmlns:v="urn:schemas-microsoft-com:vml" Requires="v">
-                <p:oleObj spid="_x0000_s3121" name="方程式" r:id="rId3" imgW="419040" imgH="444240" progId="Equation.3">
+                <p:oleObj spid="_x0000_s3135" name="方程式" r:id="rId3" imgW="419040" imgH="444240" progId="Equation.3">
                   <p:embed/>
                 </p:oleObj>
               </mc:Choice>
@@ -22792,7 +22782,7 @@
           <a:graphicData uri="http://schemas.openxmlformats.org/presentationml/2006/ole">
             <mc:AlternateContent xmlns:mc="http://schemas.openxmlformats.org/markup-compatibility/2006">
               <mc:Choice xmlns:v="urn:schemas-microsoft-com:vml" Requires="v">
-                <p:oleObj spid="_x0000_s4192" name="方程式" r:id="rId3" imgW="457200" imgH="444240" progId="Equation.3">
+                <p:oleObj spid="_x0000_s4220" name="方程式" r:id="rId3" imgW="457200" imgH="444240" progId="Equation.3">
                   <p:embed/>
                 </p:oleObj>
               </mc:Choice>
@@ -22887,7 +22877,7 @@
           <a:graphicData uri="http://schemas.openxmlformats.org/presentationml/2006/ole">
             <mc:AlternateContent xmlns:mc="http://schemas.openxmlformats.org/markup-compatibility/2006">
               <mc:Choice xmlns:v="urn:schemas-microsoft-com:vml" Requires="v">
-                <p:oleObj spid="_x0000_s4193" name="方程式" r:id="rId5" imgW="609480" imgH="457200" progId="Equation.3">
+                <p:oleObj spid="_x0000_s4221" name="方程式" r:id="rId5" imgW="609480" imgH="457200" progId="Equation.3">
                   <p:embed/>
                 </p:oleObj>
               </mc:Choice>
@@ -24368,7 +24358,7 @@
                         <a:tabLst/>
                       </a:pPr>
                       <a:r>
-                        <a:rPr kumimoji="1" lang="en-US" altLang="zh-TW" sz="2800" b="0" i="0" u="none" strike="noStrike" cap="none" normalizeH="0" baseline="0" smtClean="0">
+                        <a:rPr kumimoji="1" lang="en-US" altLang="zh-TW" sz="2800" b="0" i="0" u="none" strike="noStrike" cap="none" normalizeH="0" baseline="0" dirty="0" smtClean="0">
                           <a:ln>
                             <a:noFill/>
                           </a:ln>
@@ -24427,6 +24417,84 @@
           </a:graphicData>
         </a:graphic>
       </p:graphicFrame>
+      <p:sp>
+        <p:nvSpPr>
+          <p:cNvPr id="3" name="TextBox 2"/>
+          <p:cNvSpPr txBox="1"/>
+          <p:nvPr/>
+        </p:nvSpPr>
+        <p:spPr>
+          <a:xfrm>
+            <a:off x="7345363" y="4140875"/>
+            <a:ext cx="1611313" cy="2031325"/>
+          </a:xfrm>
+          <a:prstGeom prst="rect">
+            <a:avLst/>
+          </a:prstGeom>
+        </p:spPr>
+        <p:style>
+          <a:lnRef idx="2">
+            <a:schemeClr val="dk1">
+              <a:shade val="50000"/>
+            </a:schemeClr>
+          </a:lnRef>
+          <a:fillRef idx="1">
+            <a:schemeClr val="dk1"/>
+          </a:fillRef>
+          <a:effectRef idx="0">
+            <a:schemeClr val="dk1"/>
+          </a:effectRef>
+          <a:fontRef idx="minor">
+            <a:schemeClr val="lt1"/>
+          </a:fontRef>
+        </p:style>
+        <p:txBody>
+          <a:bodyPr wrap="square" rtlCol="0">
+            <a:spAutoFit/>
+          </a:bodyPr>
+          <a:lstStyle/>
+          <a:p>
+            <a:r>
+              <a:rPr lang="en-US" dirty="0" smtClean="0"/>
+              <a:t>Input</a:t>
+            </a:r>
+          </a:p>
+          <a:p>
+            <a:r>
+              <a:rPr lang="en-US" dirty="0" smtClean="0"/>
+              <a:t>3</a:t>
+            </a:r>
+          </a:p>
+          <a:p>
+            <a:r>
+              <a:rPr lang="en-US" dirty="0" smtClean="0"/>
+              <a:t>5 10 3</a:t>
+            </a:r>
+          </a:p>
+          <a:p>
+            <a:endParaRPr lang="en-US" dirty="0"/>
+          </a:p>
+          <a:p>
+            <a:r>
+              <a:rPr lang="en-US" dirty="0" smtClean="0"/>
+              <a:t>Output</a:t>
+            </a:r>
+          </a:p>
+          <a:p>
+            <a:r>
+              <a:rPr lang="en-US" dirty="0" smtClean="0"/>
+              <a:t>3 1 2</a:t>
+            </a:r>
+          </a:p>
+          <a:p>
+            <a:r>
+              <a:rPr lang="en-US" dirty="0" smtClean="0"/>
+              <a:t>29</a:t>
+            </a:r>
+            <a:endParaRPr lang="en-US" dirty="0"/>
+          </a:p>
+        </p:txBody>
+      </p:sp>
     </p:spTree>
     <p:extLst>
       <p:ext uri="{BB962C8B-B14F-4D97-AF65-F5344CB8AC3E}">
@@ -24502,7 +24570,7 @@
           <a:bodyPr/>
           <a:lstStyle/>
           <a:p>
-            <a:endParaRPr lang="en-US"/>
+            <a:endParaRPr lang="en-US" dirty="0"/>
           </a:p>
         </p:txBody>
       </p:sp>
@@ -24545,6 +24613,550 @@
       </p:grpSpPr>
       <p:sp>
         <p:nvSpPr>
+          <p:cNvPr id="4" name="Title 3"/>
+          <p:cNvSpPr>
+            <a:spLocks noGrp="1"/>
+          </p:cNvSpPr>
+          <p:nvPr>
+            <p:ph type="title"/>
+          </p:nvPr>
+        </p:nvSpPr>
+        <p:spPr/>
+        <p:txBody>
+          <a:bodyPr/>
+          <a:lstStyle/>
+          <a:p>
+            <a:r>
+              <a:rPr lang="en-US" dirty="0" smtClean="0"/>
+              <a:t>Knapsack Problem</a:t>
+            </a:r>
+            <a:endParaRPr lang="en-US" dirty="0"/>
+          </a:p>
+        </p:txBody>
+      </p:sp>
+      <p:sp>
+        <p:nvSpPr>
+          <p:cNvPr id="5" name="Content Placeholder 4"/>
+          <p:cNvSpPr>
+            <a:spLocks noGrp="1"/>
+          </p:cNvSpPr>
+          <p:nvPr>
+            <p:ph idx="1"/>
+          </p:nvPr>
+        </p:nvSpPr>
+        <p:spPr/>
+        <p:txBody>
+          <a:bodyPr/>
+          <a:lstStyle/>
+          <a:p>
+            <a:r>
+              <a:rPr lang="en-US" dirty="0" smtClean="0"/>
+              <a:t>0-1 problem </a:t>
+            </a:r>
+            <a:r>
+              <a:rPr lang="en-US" dirty="0" smtClean="0">
+                <a:sym typeface="Wingdings" panose="05000000000000000000" pitchFamily="2" charset="2"/>
+              </a:rPr>
+              <a:t> DP solution</a:t>
+            </a:r>
+            <a:endParaRPr lang="en-US" dirty="0" smtClean="0"/>
+          </a:p>
+        </p:txBody>
+      </p:sp>
+      <p:pic>
+        <p:nvPicPr>
+          <p:cNvPr id="7" name="Picture 6"/>
+          <p:cNvPicPr>
+            <a:picLocks noChangeAspect="1"/>
+          </p:cNvPicPr>
+          <p:nvPr/>
+        </p:nvPicPr>
+        <p:blipFill>
+          <a:blip r:embed="rId2"/>
+          <a:stretch>
+            <a:fillRect/>
+          </a:stretch>
+        </p:blipFill>
+        <p:spPr>
+          <a:xfrm>
+            <a:off x="2319337" y="2409825"/>
+            <a:ext cx="4505325" cy="4210050"/>
+          </a:xfrm>
+          <a:prstGeom prst="rect">
+            <a:avLst/>
+          </a:prstGeom>
+        </p:spPr>
+      </p:pic>
+    </p:spTree>
+    <p:extLst>
+      <p:ext uri="{BB962C8B-B14F-4D97-AF65-F5344CB8AC3E}">
+        <p14:creationId xmlns:p14="http://schemas.microsoft.com/office/powerpoint/2010/main" val="2533555295"/>
+      </p:ext>
+    </p:extLst>
+  </p:cSld>
+  <p:clrMapOvr>
+    <a:masterClrMapping/>
+  </p:clrMapOvr>
+  <p:timing>
+    <p:tnLst>
+      <p:par>
+        <p:cTn id="1" dur="indefinite" restart="never" nodeType="tmRoot"/>
+      </p:par>
+    </p:tnLst>
+  </p:timing>
+</p:sld>
+</file>
+
+<file path=ppt/slides/slide4.xml><?xml version="1.0" encoding="utf-8"?>
+<p:sld xmlns:a="http://schemas.openxmlformats.org/drawingml/2006/main" xmlns:r="http://schemas.openxmlformats.org/officeDocument/2006/relationships" xmlns:p="http://schemas.openxmlformats.org/presentationml/2006/main">
+  <p:cSld>
+    <p:spTree>
+      <p:nvGrpSpPr>
+        <p:cNvPr id="1" name=""/>
+        <p:cNvGrpSpPr/>
+        <p:nvPr/>
+      </p:nvGrpSpPr>
+      <p:grpSpPr>
+        <a:xfrm>
+          <a:off x="0" y="0"/>
+          <a:ext cx="0" cy="0"/>
+          <a:chOff x="0" y="0"/>
+          <a:chExt cx="0" cy="0"/>
+        </a:xfrm>
+      </p:grpSpPr>
+      <p:sp>
+        <p:nvSpPr>
+          <p:cNvPr id="6146" name="Rectangle 2"/>
+          <p:cNvSpPr>
+            <a:spLocks noChangeArrowheads="1"/>
+          </p:cNvSpPr>
+          <p:nvPr/>
+        </p:nvSpPr>
+        <p:spPr bwMode="auto">
+          <a:xfrm>
+            <a:off x="685800" y="6248400"/>
+            <a:ext cx="1905000" cy="457200"/>
+          </a:xfrm>
+          <a:prstGeom prst="rect">
+            <a:avLst/>
+          </a:prstGeom>
+          <a:noFill/>
+          <a:ln>
+            <a:noFill/>
+          </a:ln>
+          <a:effectLst/>
+          <a:extLst>
+            <a:ext uri="{909E8E84-426E-40DD-AFC4-6F175D3DCCD1}">
+              <a14:hiddenFill xmlns:a14="http://schemas.microsoft.com/office/drawing/2010/main">
+                <a:solidFill>
+                  <a:schemeClr val="accent1"/>
+                </a:solidFill>
+              </a14:hiddenFill>
+            </a:ext>
+            <a:ext uri="{91240B29-F687-4F45-9708-019B960494DF}">
+              <a14:hiddenLine xmlns:a14="http://schemas.microsoft.com/office/drawing/2010/main" w="12700">
+                <a:solidFill>
+                  <a:srgbClr val="00FFFF"/>
+                </a:solidFill>
+                <a:miter lim="800000"/>
+                <a:headEnd/>
+                <a:tailEnd/>
+              </a14:hiddenLine>
+            </a:ext>
+            <a:ext uri="{AF507438-7753-43E0-B8FC-AC1667EBCBE1}">
+              <a14:hiddenEffects xmlns:a14="http://schemas.microsoft.com/office/drawing/2010/main">
+                <a:effectLst>
+                  <a:outerShdw dist="35921" dir="2700000" algn="ctr" rotWithShape="0">
+                    <a:schemeClr val="bg2"/>
+                  </a:outerShdw>
+                </a:effectLst>
+              </a14:hiddenEffects>
+            </a:ext>
+          </a:extLst>
+        </p:spPr>
+        <p:txBody>
+          <a:bodyPr wrap="none" anchor="ctr"/>
+          <a:lstStyle/>
+          <a:p>
+            <a:endParaRPr lang="en-US"/>
+          </a:p>
+        </p:txBody>
+      </p:sp>
+      <p:sp>
+        <p:nvSpPr>
+          <p:cNvPr id="6147" name="Rectangle 3"/>
+          <p:cNvSpPr>
+            <a:spLocks noChangeArrowheads="1"/>
+          </p:cNvSpPr>
+          <p:nvPr/>
+        </p:nvSpPr>
+        <p:spPr bwMode="auto">
+          <a:xfrm>
+            <a:off x="3124200" y="6248400"/>
+            <a:ext cx="2895600" cy="457200"/>
+          </a:xfrm>
+          <a:prstGeom prst="rect">
+            <a:avLst/>
+          </a:prstGeom>
+          <a:noFill/>
+          <a:ln>
+            <a:noFill/>
+          </a:ln>
+          <a:effectLst/>
+          <a:extLst>
+            <a:ext uri="{909E8E84-426E-40DD-AFC4-6F175D3DCCD1}">
+              <a14:hiddenFill xmlns:a14="http://schemas.microsoft.com/office/drawing/2010/main">
+                <a:solidFill>
+                  <a:schemeClr val="accent1"/>
+                </a:solidFill>
+              </a14:hiddenFill>
+            </a:ext>
+            <a:ext uri="{91240B29-F687-4F45-9708-019B960494DF}">
+              <a14:hiddenLine xmlns:a14="http://schemas.microsoft.com/office/drawing/2010/main" w="12700">
+                <a:solidFill>
+                  <a:srgbClr val="00FFFF"/>
+                </a:solidFill>
+                <a:miter lim="800000"/>
+                <a:headEnd/>
+                <a:tailEnd/>
+              </a14:hiddenLine>
+            </a:ext>
+            <a:ext uri="{AF507438-7753-43E0-B8FC-AC1667EBCBE1}">
+              <a14:hiddenEffects xmlns:a14="http://schemas.microsoft.com/office/drawing/2010/main">
+                <a:effectLst>
+                  <a:outerShdw dist="35921" dir="2700000" algn="ctr" rotWithShape="0">
+                    <a:schemeClr val="bg2"/>
+                  </a:outerShdw>
+                </a:effectLst>
+              </a14:hiddenEffects>
+            </a:ext>
+          </a:extLst>
+        </p:spPr>
+        <p:txBody>
+          <a:bodyPr wrap="none" anchor="ctr"/>
+          <a:lstStyle/>
+          <a:p>
+            <a:endParaRPr lang="en-US"/>
+          </a:p>
+        </p:txBody>
+      </p:sp>
+      <p:sp>
+        <p:nvSpPr>
+          <p:cNvPr id="6148" name="Rectangle 4"/>
+          <p:cNvSpPr>
+            <a:spLocks noGrp="1" noChangeArrowheads="1"/>
+          </p:cNvSpPr>
+          <p:nvPr>
+            <p:ph type="title"/>
+          </p:nvPr>
+        </p:nvSpPr>
+        <p:spPr>
+          <a:xfrm>
+            <a:off x="628650" y="327025"/>
+            <a:ext cx="7793038" cy="762000"/>
+          </a:xfrm>
+          <a:noFill/>
+          <a:ln/>
+          <a:extLst>
+            <a:ext uri="{91240B29-F687-4F45-9708-019B960494DF}">
+              <a14:hiddenLine xmlns:a14="http://schemas.microsoft.com/office/drawing/2010/main" w="12700">
+                <a:solidFill>
+                  <a:schemeClr val="tx1"/>
+                </a:solidFill>
+                <a:miter lim="800000"/>
+                <a:headEnd/>
+                <a:tailEnd/>
+              </a14:hiddenLine>
+            </a:ext>
+          </a:extLst>
+        </p:spPr>
+        <p:txBody>
+          <a:bodyPr lIns="90488" tIns="44450" rIns="90488" bIns="44450" anchor="ctr"/>
+          <a:lstStyle/>
+          <a:p>
+            <a:r>
+              <a:rPr lang="en-US" dirty="0"/>
+              <a:t>Optimization problems</a:t>
+            </a:r>
+          </a:p>
+        </p:txBody>
+      </p:sp>
+      <p:sp>
+        <p:nvSpPr>
+          <p:cNvPr id="6149" name="Rectangle 5"/>
+          <p:cNvSpPr>
+            <a:spLocks noGrp="1" noChangeArrowheads="1"/>
+          </p:cNvSpPr>
+          <p:nvPr>
+            <p:ph type="body" idx="1"/>
+          </p:nvPr>
+        </p:nvSpPr>
+        <p:spPr>
+          <a:xfrm>
+            <a:off x="685800" y="1524000"/>
+            <a:ext cx="7772400" cy="4953000"/>
+          </a:xfrm>
+          <a:noFill/>
+          <a:ln/>
+          <a:extLst>
+            <a:ext uri="{91240B29-F687-4F45-9708-019B960494DF}">
+              <a14:hiddenLine xmlns:a14="http://schemas.microsoft.com/office/drawing/2010/main" w="12700">
+                <a:solidFill>
+                  <a:schemeClr val="tx1"/>
+                </a:solidFill>
+                <a:miter lim="800000"/>
+                <a:headEnd/>
+                <a:tailEnd/>
+              </a14:hiddenLine>
+            </a:ext>
+          </a:extLst>
+        </p:spPr>
+        <p:txBody>
+          <a:bodyPr lIns="90488" tIns="44450" rIns="90488" bIns="44450">
+            <a:normAutofit fontScale="77500" lnSpcReduction="20000"/>
+          </a:bodyPr>
+          <a:lstStyle/>
+          <a:p>
+            <a:r>
+              <a:rPr lang="en-US" dirty="0"/>
+              <a:t>An </a:t>
+            </a:r>
+            <a:r>
+              <a:rPr lang="en-US" dirty="0">
+                <a:solidFill>
+                  <a:schemeClr val="tx2"/>
+                </a:solidFill>
+              </a:rPr>
+              <a:t>optimization problem</a:t>
+            </a:r>
+            <a:r>
+              <a:rPr lang="en-US" dirty="0"/>
+              <a:t> is one in which you want to find, not just </a:t>
+            </a:r>
+            <a:r>
+              <a:rPr lang="en-US" i="1" dirty="0"/>
+              <a:t>a</a:t>
+            </a:r>
+            <a:r>
+              <a:rPr lang="en-US" dirty="0"/>
+              <a:t> solution, but the </a:t>
+            </a:r>
+            <a:r>
+              <a:rPr lang="en-US" i="1" dirty="0"/>
+              <a:t>best</a:t>
+            </a:r>
+            <a:r>
+              <a:rPr lang="en-US" dirty="0"/>
+              <a:t> solution</a:t>
+            </a:r>
+          </a:p>
+          <a:p>
+            <a:r>
+              <a:rPr lang="en-US" dirty="0"/>
+              <a:t>A “greedy algorithm” sometimes works well for optimization problems</a:t>
+            </a:r>
+          </a:p>
+          <a:p>
+            <a:r>
+              <a:rPr lang="en-US" dirty="0"/>
+              <a:t>A </a:t>
+            </a:r>
+            <a:r>
+              <a:rPr lang="en-US" dirty="0">
+                <a:solidFill>
+                  <a:schemeClr val="tx2"/>
+                </a:solidFill>
+              </a:rPr>
+              <a:t>greedy algorithm</a:t>
+            </a:r>
+            <a:r>
+              <a:rPr lang="en-US" dirty="0"/>
+              <a:t> works in phases. At each phase:</a:t>
+            </a:r>
+          </a:p>
+          <a:p>
+            <a:pPr lvl="1"/>
+            <a:r>
+              <a:rPr lang="en-US" dirty="0"/>
+              <a:t>You take the best you can get right now, without regard for future consequences</a:t>
+            </a:r>
+          </a:p>
+          <a:p>
+            <a:pPr lvl="1"/>
+            <a:r>
+              <a:rPr lang="en-US" dirty="0"/>
+              <a:t>You hope that by choosing a </a:t>
+            </a:r>
+            <a:r>
+              <a:rPr lang="en-US" i="1" dirty="0"/>
+              <a:t>local</a:t>
+            </a:r>
+            <a:r>
+              <a:rPr lang="en-US" dirty="0"/>
+              <a:t> optimum at each step, you will end up at a </a:t>
+            </a:r>
+            <a:r>
+              <a:rPr lang="en-US" i="1" dirty="0"/>
+              <a:t>global</a:t>
+            </a:r>
+            <a:r>
+              <a:rPr lang="en-US" dirty="0"/>
+              <a:t> optimum</a:t>
+            </a:r>
+          </a:p>
+        </p:txBody>
+      </p:sp>
+    </p:spTree>
+    <p:extLst>
+      <p:ext uri="{BB962C8B-B14F-4D97-AF65-F5344CB8AC3E}">
+        <p14:creationId xmlns:p14="http://schemas.microsoft.com/office/powerpoint/2010/main" val="536542080"/>
+      </p:ext>
+    </p:extLst>
+  </p:cSld>
+  <p:clrMapOvr>
+    <a:masterClrMapping/>
+  </p:clrMapOvr>
+  <p:transition spd="slow"/>
+  <p:timing>
+    <p:tnLst>
+      <p:par>
+        <p:cTn id="1" dur="indefinite" restart="never" nodeType="tmRoot"/>
+      </p:par>
+    </p:tnLst>
+  </p:timing>
+</p:sld>
+</file>
+
+<file path=ppt/slides/slide40.xml><?xml version="1.0" encoding="utf-8"?>
+<p:sld xmlns:a="http://schemas.openxmlformats.org/drawingml/2006/main" xmlns:r="http://schemas.openxmlformats.org/officeDocument/2006/relationships" xmlns:p="http://schemas.openxmlformats.org/presentationml/2006/main">
+  <p:cSld>
+    <p:spTree>
+      <p:nvGrpSpPr>
+        <p:cNvPr id="1" name=""/>
+        <p:cNvGrpSpPr/>
+        <p:nvPr/>
+      </p:nvGrpSpPr>
+      <p:grpSpPr>
+        <a:xfrm>
+          <a:off x="0" y="0"/>
+          <a:ext cx="0" cy="0"/>
+          <a:chOff x="0" y="0"/>
+          <a:chExt cx="0" cy="0"/>
+        </a:xfrm>
+      </p:grpSpPr>
+      <p:pic>
+        <p:nvPicPr>
+          <p:cNvPr id="4" name="Picture 3"/>
+          <p:cNvPicPr>
+            <a:picLocks noChangeAspect="1"/>
+          </p:cNvPicPr>
+          <p:nvPr/>
+        </p:nvPicPr>
+        <p:blipFill>
+          <a:blip r:embed="rId2"/>
+          <a:stretch>
+            <a:fillRect/>
+          </a:stretch>
+        </p:blipFill>
+        <p:spPr>
+          <a:xfrm>
+            <a:off x="495997" y="2586036"/>
+            <a:ext cx="8152006" cy="3157537"/>
+          </a:xfrm>
+          <a:prstGeom prst="rect">
+            <a:avLst/>
+          </a:prstGeom>
+        </p:spPr>
+      </p:pic>
+      <p:sp>
+        <p:nvSpPr>
+          <p:cNvPr id="5" name="Title 4"/>
+          <p:cNvSpPr>
+            <a:spLocks noGrp="1"/>
+          </p:cNvSpPr>
+          <p:nvPr>
+            <p:ph type="title"/>
+          </p:nvPr>
+        </p:nvSpPr>
+        <p:spPr/>
+        <p:txBody>
+          <a:bodyPr/>
+          <a:lstStyle/>
+          <a:p>
+            <a:r>
+              <a:rPr lang="en-US" dirty="0" smtClean="0"/>
+              <a:t>Knapsack Problem</a:t>
+            </a:r>
+            <a:endParaRPr lang="en-US" dirty="0"/>
+          </a:p>
+        </p:txBody>
+      </p:sp>
+      <p:sp>
+        <p:nvSpPr>
+          <p:cNvPr id="6" name="Content Placeholder 5"/>
+          <p:cNvSpPr>
+            <a:spLocks noGrp="1"/>
+          </p:cNvSpPr>
+          <p:nvPr>
+            <p:ph idx="1"/>
+          </p:nvPr>
+        </p:nvSpPr>
+        <p:spPr/>
+        <p:txBody>
+          <a:bodyPr/>
+          <a:lstStyle/>
+          <a:p>
+            <a:r>
+              <a:rPr lang="en-US" dirty="0"/>
+              <a:t>Fractional </a:t>
+            </a:r>
+            <a:r>
+              <a:rPr lang="en-US" dirty="0" smtClean="0"/>
+              <a:t>Problem</a:t>
+            </a:r>
+            <a:endParaRPr lang="en-US" dirty="0"/>
+          </a:p>
+        </p:txBody>
+      </p:sp>
+    </p:spTree>
+    <p:extLst>
+      <p:ext uri="{BB962C8B-B14F-4D97-AF65-F5344CB8AC3E}">
+        <p14:creationId xmlns:p14="http://schemas.microsoft.com/office/powerpoint/2010/main" val="3829584388"/>
+      </p:ext>
+    </p:extLst>
+  </p:cSld>
+  <p:clrMapOvr>
+    <a:masterClrMapping/>
+  </p:clrMapOvr>
+  <p:timing>
+    <p:tnLst>
+      <p:par>
+        <p:cTn id="1" dur="indefinite" restart="never" nodeType="tmRoot"/>
+      </p:par>
+    </p:tnLst>
+  </p:timing>
+</p:sld>
+</file>
+
+<file path=ppt/slides/slide41.xml><?xml version="1.0" encoding="utf-8"?>
+<p:sld xmlns:a="http://schemas.openxmlformats.org/drawingml/2006/main" xmlns:r="http://schemas.openxmlformats.org/officeDocument/2006/relationships" xmlns:p="http://schemas.openxmlformats.org/presentationml/2006/main">
+  <p:cSld>
+    <p:spTree>
+      <p:nvGrpSpPr>
+        <p:cNvPr id="1" name=""/>
+        <p:cNvGrpSpPr/>
+        <p:nvPr/>
+      </p:nvGrpSpPr>
+      <p:grpSpPr>
+        <a:xfrm>
+          <a:off x="0" y="0"/>
+          <a:ext cx="0" cy="0"/>
+          <a:chOff x="0" y="0"/>
+          <a:chExt cx="0" cy="0"/>
+        </a:xfrm>
+      </p:grpSpPr>
+      <p:sp>
+        <p:nvSpPr>
           <p:cNvPr id="70658" name="Text Box 2"/>
           <p:cNvSpPr txBox="1">
             <a:spLocks noChangeArrowheads="1"/>
@@ -24553,7 +25165,7 @@
         </p:nvSpPr>
         <p:spPr bwMode="auto">
           <a:xfrm>
-            <a:off x="685800" y="533400"/>
+            <a:off x="685800" y="776287"/>
             <a:ext cx="7772400" cy="4745915"/>
           </a:xfrm>
           <a:prstGeom prst="rect">
@@ -24718,7 +25330,37 @@
               <a:rPr lang="en-US" altLang="zh-CN" dirty="0">
                 <a:ea typeface="宋体" panose="02010600030101010101" pitchFamily="2" charset="-122"/>
               </a:rPr>
-              <a:t>.  The problem is to pack the knapsack with these objects in order to maximize the total value of those objects packed without exceeding the knapsack’s capacity.  More formally, let </a:t>
+              <a:t>.  The problem is to pack the knapsack with these objects in order to </a:t>
+            </a:r>
+            <a:r>
+              <a:rPr lang="en-US" altLang="zh-CN" b="1" dirty="0">
+                <a:solidFill>
+                  <a:srgbClr val="FF0000"/>
+                </a:solidFill>
+                <a:ea typeface="宋体" panose="02010600030101010101" pitchFamily="2" charset="-122"/>
+              </a:rPr>
+              <a:t>maximize the total value of those objects </a:t>
+            </a:r>
+            <a:r>
+              <a:rPr lang="en-US" altLang="zh-CN" dirty="0">
+                <a:ea typeface="宋体" panose="02010600030101010101" pitchFamily="2" charset="-122"/>
+              </a:rPr>
+              <a:t>packed </a:t>
+            </a:r>
+            <a:r>
+              <a:rPr lang="en-US" altLang="zh-CN" b="1" dirty="0">
+                <a:solidFill>
+                  <a:srgbClr val="FF0000"/>
+                </a:solidFill>
+                <a:ea typeface="宋体" panose="02010600030101010101" pitchFamily="2" charset="-122"/>
+              </a:rPr>
+              <a:t>without exceeding the knapsack’s capacity</a:t>
+            </a:r>
+            <a:r>
+              <a:rPr lang="en-US" altLang="zh-CN" dirty="0">
+                <a:ea typeface="宋体" panose="02010600030101010101" pitchFamily="2" charset="-122"/>
+              </a:rPr>
+              <a:t>.  More formally, let </a:t>
             </a:r>
             <a:r>
               <a:rPr lang="en-US" altLang="zh-CN" i="1" dirty="0">
@@ -24986,7 +25628,7 @@
           <a:graphicData uri="http://schemas.openxmlformats.org/presentationml/2006/ole">
             <mc:AlternateContent xmlns:mc="http://schemas.openxmlformats.org/markup-compatibility/2006">
               <mc:Choice xmlns:v="urn:schemas-microsoft-com:vml" Requires="v">
-                <p:oleObj spid="_x0000_s5216" name="Equation" r:id="rId3" imgW="3340080" imgH="622080" progId="Equation.3">
+                <p:oleObj spid="_x0000_s5244" name="Equation" r:id="rId3" imgW="3340080" imgH="622080" progId="Equation.3">
                   <p:embed/>
                 </p:oleObj>
               </mc:Choice>
@@ -25085,7 +25727,7 @@
           <a:graphicData uri="http://schemas.openxmlformats.org/presentationml/2006/ole">
             <mc:AlternateContent xmlns:mc="http://schemas.openxmlformats.org/markup-compatibility/2006">
               <mc:Choice xmlns:v="urn:schemas-microsoft-com:vml" Requires="v">
-                <p:oleObj spid="_x0000_s5217" name="Equation" r:id="rId5" imgW="914400" imgH="622080" progId="Equation.3">
+                <p:oleObj spid="_x0000_s5245" name="Equation" r:id="rId5" imgW="914400" imgH="622080" progId="Equation.3">
                   <p:embed/>
                 </p:oleObj>
               </mc:Choice>
@@ -25182,327 +25824,7 @@
 </p:sld>
 </file>
 
-<file path=ppt/slides/slide4.xml><?xml version="1.0" encoding="utf-8"?>
-<p:sld xmlns:a="http://schemas.openxmlformats.org/drawingml/2006/main" xmlns:r="http://schemas.openxmlformats.org/officeDocument/2006/relationships" xmlns:p="http://schemas.openxmlformats.org/presentationml/2006/main">
-  <p:cSld>
-    <p:spTree>
-      <p:nvGrpSpPr>
-        <p:cNvPr id="1" name=""/>
-        <p:cNvGrpSpPr/>
-        <p:nvPr/>
-      </p:nvGrpSpPr>
-      <p:grpSpPr>
-        <a:xfrm>
-          <a:off x="0" y="0"/>
-          <a:ext cx="0" cy="0"/>
-          <a:chOff x="0" y="0"/>
-          <a:chExt cx="0" cy="0"/>
-        </a:xfrm>
-      </p:grpSpPr>
-      <p:sp>
-        <p:nvSpPr>
-          <p:cNvPr id="6146" name="Rectangle 2"/>
-          <p:cNvSpPr>
-            <a:spLocks noChangeArrowheads="1"/>
-          </p:cNvSpPr>
-          <p:nvPr/>
-        </p:nvSpPr>
-        <p:spPr bwMode="auto">
-          <a:xfrm>
-            <a:off x="685800" y="6248400"/>
-            <a:ext cx="1905000" cy="457200"/>
-          </a:xfrm>
-          <a:prstGeom prst="rect">
-            <a:avLst/>
-          </a:prstGeom>
-          <a:noFill/>
-          <a:ln>
-            <a:noFill/>
-          </a:ln>
-          <a:effectLst/>
-          <a:extLst>
-            <a:ext uri="{909E8E84-426E-40DD-AFC4-6F175D3DCCD1}">
-              <a14:hiddenFill xmlns:a14="http://schemas.microsoft.com/office/drawing/2010/main">
-                <a:solidFill>
-                  <a:schemeClr val="accent1"/>
-                </a:solidFill>
-              </a14:hiddenFill>
-            </a:ext>
-            <a:ext uri="{91240B29-F687-4F45-9708-019B960494DF}">
-              <a14:hiddenLine xmlns:a14="http://schemas.microsoft.com/office/drawing/2010/main" w="12700">
-                <a:solidFill>
-                  <a:srgbClr val="00FFFF"/>
-                </a:solidFill>
-                <a:miter lim="800000"/>
-                <a:headEnd/>
-                <a:tailEnd/>
-              </a14:hiddenLine>
-            </a:ext>
-            <a:ext uri="{AF507438-7753-43E0-B8FC-AC1667EBCBE1}">
-              <a14:hiddenEffects xmlns:a14="http://schemas.microsoft.com/office/drawing/2010/main">
-                <a:effectLst>
-                  <a:outerShdw dist="35921" dir="2700000" algn="ctr" rotWithShape="0">
-                    <a:schemeClr val="bg2"/>
-                  </a:outerShdw>
-                </a:effectLst>
-              </a14:hiddenEffects>
-            </a:ext>
-          </a:extLst>
-        </p:spPr>
-        <p:txBody>
-          <a:bodyPr wrap="none" anchor="ctr"/>
-          <a:lstStyle/>
-          <a:p>
-            <a:endParaRPr lang="en-US"/>
-          </a:p>
-        </p:txBody>
-      </p:sp>
-      <p:sp>
-        <p:nvSpPr>
-          <p:cNvPr id="6147" name="Rectangle 3"/>
-          <p:cNvSpPr>
-            <a:spLocks noChangeArrowheads="1"/>
-          </p:cNvSpPr>
-          <p:nvPr/>
-        </p:nvSpPr>
-        <p:spPr bwMode="auto">
-          <a:xfrm>
-            <a:off x="3124200" y="6248400"/>
-            <a:ext cx="2895600" cy="457200"/>
-          </a:xfrm>
-          <a:prstGeom prst="rect">
-            <a:avLst/>
-          </a:prstGeom>
-          <a:noFill/>
-          <a:ln>
-            <a:noFill/>
-          </a:ln>
-          <a:effectLst/>
-          <a:extLst>
-            <a:ext uri="{909E8E84-426E-40DD-AFC4-6F175D3DCCD1}">
-              <a14:hiddenFill xmlns:a14="http://schemas.microsoft.com/office/drawing/2010/main">
-                <a:solidFill>
-                  <a:schemeClr val="accent1"/>
-                </a:solidFill>
-              </a14:hiddenFill>
-            </a:ext>
-            <a:ext uri="{91240B29-F687-4F45-9708-019B960494DF}">
-              <a14:hiddenLine xmlns:a14="http://schemas.microsoft.com/office/drawing/2010/main" w="12700">
-                <a:solidFill>
-                  <a:srgbClr val="00FFFF"/>
-                </a:solidFill>
-                <a:miter lim="800000"/>
-                <a:headEnd/>
-                <a:tailEnd/>
-              </a14:hiddenLine>
-            </a:ext>
-            <a:ext uri="{AF507438-7753-43E0-B8FC-AC1667EBCBE1}">
-              <a14:hiddenEffects xmlns:a14="http://schemas.microsoft.com/office/drawing/2010/main">
-                <a:effectLst>
-                  <a:outerShdw dist="35921" dir="2700000" algn="ctr" rotWithShape="0">
-                    <a:schemeClr val="bg2"/>
-                  </a:outerShdw>
-                </a:effectLst>
-              </a14:hiddenEffects>
-            </a:ext>
-          </a:extLst>
-        </p:spPr>
-        <p:txBody>
-          <a:bodyPr wrap="none" anchor="ctr"/>
-          <a:lstStyle/>
-          <a:p>
-            <a:endParaRPr lang="en-US"/>
-          </a:p>
-        </p:txBody>
-      </p:sp>
-      <p:sp>
-        <p:nvSpPr>
-          <p:cNvPr id="6148" name="Rectangle 4"/>
-          <p:cNvSpPr>
-            <a:spLocks noGrp="1" noChangeArrowheads="1"/>
-          </p:cNvSpPr>
-          <p:nvPr>
-            <p:ph type="title"/>
-          </p:nvPr>
-        </p:nvSpPr>
-        <p:spPr>
-          <a:xfrm>
-            <a:off x="628650" y="327025"/>
-            <a:ext cx="7793038" cy="762000"/>
-          </a:xfrm>
-          <a:noFill/>
-          <a:ln/>
-          <a:extLst>
-            <a:ext uri="{91240B29-F687-4F45-9708-019B960494DF}">
-              <a14:hiddenLine xmlns:a14="http://schemas.microsoft.com/office/drawing/2010/main" w="12700">
-                <a:solidFill>
-                  <a:schemeClr val="tx1"/>
-                </a:solidFill>
-                <a:miter lim="800000"/>
-                <a:headEnd/>
-                <a:tailEnd/>
-              </a14:hiddenLine>
-            </a:ext>
-          </a:extLst>
-        </p:spPr>
-        <p:txBody>
-          <a:bodyPr lIns="90488" tIns="44450" rIns="90488" bIns="44450" anchor="ctr"/>
-          <a:lstStyle/>
-          <a:p>
-            <a:r>
-              <a:rPr lang="en-US" dirty="0"/>
-              <a:t>Optimization problems</a:t>
-            </a:r>
-          </a:p>
-        </p:txBody>
-      </p:sp>
-      <p:sp>
-        <p:nvSpPr>
-          <p:cNvPr id="6149" name="Rectangle 5"/>
-          <p:cNvSpPr>
-            <a:spLocks noGrp="1" noChangeArrowheads="1"/>
-          </p:cNvSpPr>
-          <p:nvPr>
-            <p:ph type="body" idx="1"/>
-          </p:nvPr>
-        </p:nvSpPr>
-        <p:spPr>
-          <a:xfrm>
-            <a:off x="685800" y="1524000"/>
-            <a:ext cx="7772400" cy="4953000"/>
-          </a:xfrm>
-          <a:noFill/>
-          <a:ln/>
-          <a:extLst>
-            <a:ext uri="{91240B29-F687-4F45-9708-019B960494DF}">
-              <a14:hiddenLine xmlns:a14="http://schemas.microsoft.com/office/drawing/2010/main" w="12700">
-                <a:solidFill>
-                  <a:schemeClr val="tx1"/>
-                </a:solidFill>
-                <a:miter lim="800000"/>
-                <a:headEnd/>
-                <a:tailEnd/>
-              </a14:hiddenLine>
-            </a:ext>
-          </a:extLst>
-        </p:spPr>
-        <p:txBody>
-          <a:bodyPr lIns="90488" tIns="44450" rIns="90488" bIns="44450">
-            <a:normAutofit fontScale="77500" lnSpcReduction="20000"/>
-          </a:bodyPr>
-          <a:lstStyle/>
-          <a:p>
-            <a:r>
-              <a:rPr lang="en-US" dirty="0"/>
-              <a:t>An </a:t>
-            </a:r>
-            <a:r>
-              <a:rPr lang="en-US" dirty="0">
-                <a:solidFill>
-                  <a:schemeClr val="tx2"/>
-                </a:solidFill>
-              </a:rPr>
-              <a:t>optimization problem</a:t>
-            </a:r>
-            <a:r>
-              <a:rPr lang="en-US" dirty="0"/>
-              <a:t> is one in which you want to find, not just </a:t>
-            </a:r>
-            <a:r>
-              <a:rPr lang="en-US" i="1" dirty="0"/>
-              <a:t>a</a:t>
-            </a:r>
-            <a:r>
-              <a:rPr lang="en-US" dirty="0"/>
-              <a:t> solution, but the </a:t>
-            </a:r>
-            <a:r>
-              <a:rPr lang="en-US" i="1" dirty="0"/>
-              <a:t>best</a:t>
-            </a:r>
-            <a:r>
-              <a:rPr lang="en-US" dirty="0"/>
-              <a:t> solution</a:t>
-            </a:r>
-          </a:p>
-          <a:p>
-            <a:r>
-              <a:rPr lang="en-US" dirty="0"/>
-              <a:t>A “greedy algorithm” sometimes works well for optimization problems</a:t>
-            </a:r>
-          </a:p>
-          <a:p>
-            <a:r>
-              <a:rPr lang="en-US" dirty="0"/>
-              <a:t>A </a:t>
-            </a:r>
-            <a:r>
-              <a:rPr lang="en-US" dirty="0">
-                <a:solidFill>
-                  <a:schemeClr val="tx2"/>
-                </a:solidFill>
-              </a:rPr>
-              <a:t>greedy algorithm</a:t>
-            </a:r>
-            <a:r>
-              <a:rPr lang="en-US" dirty="0"/>
-              <a:t> works in phases. At each phase:</a:t>
-            </a:r>
-          </a:p>
-          <a:p>
-            <a:pPr lvl="1"/>
-            <a:r>
-              <a:rPr lang="en-US" dirty="0"/>
-              <a:t>You take the best you can get right now, without regard for future consequences</a:t>
-            </a:r>
-          </a:p>
-          <a:p>
-            <a:pPr lvl="1"/>
-            <a:r>
-              <a:rPr lang="en-US" dirty="0"/>
-              <a:t>You hope that by choosing a </a:t>
-            </a:r>
-            <a:r>
-              <a:rPr lang="en-US" i="1" dirty="0"/>
-              <a:t>local</a:t>
-            </a:r>
-            <a:r>
-              <a:rPr lang="en-US" dirty="0"/>
-              <a:t> optimum at each step, you will end up at a </a:t>
-            </a:r>
-            <a:r>
-              <a:rPr lang="en-US" i="1" dirty="0"/>
-              <a:t>global</a:t>
-            </a:r>
-            <a:r>
-              <a:rPr lang="en-US" dirty="0"/>
-              <a:t> optimum</a:t>
-            </a:r>
-          </a:p>
-        </p:txBody>
-      </p:sp>
-    </p:spTree>
-    <p:extLst>
-      <p:ext uri="{BB962C8B-B14F-4D97-AF65-F5344CB8AC3E}">
-        <p14:creationId xmlns:p14="http://schemas.microsoft.com/office/powerpoint/2010/main" val="536542080"/>
-      </p:ext>
-    </p:extLst>
-  </p:cSld>
-  <p:clrMapOvr>
-    <a:masterClrMapping/>
-  </p:clrMapOvr>
-  <p:transition spd="slow"/>
-  <p:timing>
-    <p:tnLst>
-      <p:par>
-        <p:cTn id="1" dur="indefinite" restart="never" nodeType="tmRoot"/>
-      </p:par>
-    </p:tnLst>
-  </p:timing>
-</p:sld>
-</file>
-
-<file path=ppt/slides/slide40.xml><?xml version="1.0" encoding="utf-8"?>
+<file path=ppt/slides/slide42.xml><?xml version="1.0" encoding="utf-8"?>
 <p:sld xmlns:a="http://schemas.openxmlformats.org/drawingml/2006/main" xmlns:r="http://schemas.openxmlformats.org/officeDocument/2006/relationships" xmlns:p="http://schemas.openxmlformats.org/presentationml/2006/main">
   <p:cSld>
     <p:spTree>
@@ -26635,7 +26957,7 @@
 </p:sld>
 </file>
 
-<file path=ppt/slides/slide41.xml><?xml version="1.0" encoding="utf-8"?>
+<file path=ppt/slides/slide43.xml><?xml version="1.0" encoding="utf-8"?>
 <p:sld xmlns:a="http://schemas.openxmlformats.org/drawingml/2006/main" xmlns:r="http://schemas.openxmlformats.org/officeDocument/2006/relationships" xmlns:p="http://schemas.openxmlformats.org/presentationml/2006/main">
   <p:cSld>
     <p:spTree>
@@ -27510,7 +27832,7 @@
           <a:graphicData uri="http://schemas.openxmlformats.org/presentationml/2006/ole">
             <mc:AlternateContent xmlns:mc="http://schemas.openxmlformats.org/markup-compatibility/2006">
               <mc:Choice xmlns:v="urn:schemas-microsoft-com:vml" Requires="v">
-                <p:oleObj spid="_x0000_s6193" name="Equation" r:id="rId3" imgW="3340080" imgH="622080" progId="Equation.3">
+                <p:oleObj spid="_x0000_s6207" name="Equation" r:id="rId3" imgW="3340080" imgH="622080" progId="Equation.3">
                   <p:embed/>
                 </p:oleObj>
               </mc:Choice>
@@ -27591,6 +27913,369 @@
     <p:extLst>
       <p:ext uri="{BB962C8B-B14F-4D97-AF65-F5344CB8AC3E}">
         <p14:creationId xmlns:p14="http://schemas.microsoft.com/office/powerpoint/2010/main" val="144624655"/>
+      </p:ext>
+    </p:extLst>
+  </p:cSld>
+  <p:clrMapOvr>
+    <a:masterClrMapping/>
+  </p:clrMapOvr>
+  <p:timing>
+    <p:tnLst>
+      <p:par>
+        <p:cTn id="1" dur="indefinite" restart="never" nodeType="tmRoot"/>
+      </p:par>
+    </p:tnLst>
+  </p:timing>
+</p:sld>
+</file>
+
+<file path=ppt/slides/slide44.xml><?xml version="1.0" encoding="utf-8"?>
+<p:sld xmlns:a="http://schemas.openxmlformats.org/drawingml/2006/main" xmlns:r="http://schemas.openxmlformats.org/officeDocument/2006/relationships" xmlns:p="http://schemas.openxmlformats.org/presentationml/2006/main">
+  <p:cSld>
+    <p:spTree>
+      <p:nvGrpSpPr>
+        <p:cNvPr id="1" name=""/>
+        <p:cNvGrpSpPr/>
+        <p:nvPr/>
+      </p:nvGrpSpPr>
+      <p:grpSpPr>
+        <a:xfrm>
+          <a:off x="0" y="0"/>
+          <a:ext cx="0" cy="0"/>
+          <a:chOff x="0" y="0"/>
+          <a:chExt cx="0" cy="0"/>
+        </a:xfrm>
+      </p:grpSpPr>
+      <p:sp>
+        <p:nvSpPr>
+          <p:cNvPr id="8" name="Title 7"/>
+          <p:cNvSpPr>
+            <a:spLocks noGrp="1"/>
+          </p:cNvSpPr>
+          <p:nvPr>
+            <p:ph type="title"/>
+          </p:nvPr>
+        </p:nvSpPr>
+        <p:spPr/>
+        <p:txBody>
+          <a:bodyPr/>
+          <a:lstStyle/>
+          <a:p>
+            <a:endParaRPr lang="en-US"/>
+          </a:p>
+        </p:txBody>
+      </p:sp>
+      <p:sp>
+        <p:nvSpPr>
+          <p:cNvPr id="6" name="Content Placeholder 5"/>
+          <p:cNvSpPr>
+            <a:spLocks noGrp="1"/>
+          </p:cNvSpPr>
+          <p:nvPr>
+            <p:ph sz="half" idx="1"/>
+          </p:nvPr>
+        </p:nvSpPr>
+        <p:spPr/>
+        <p:txBody>
+          <a:bodyPr>
+            <a:normAutofit/>
+          </a:bodyPr>
+          <a:lstStyle/>
+          <a:p>
+            <a:r>
+              <a:rPr lang="en-US" dirty="0" smtClean="0"/>
+              <a:t>Input</a:t>
+            </a:r>
+          </a:p>
+          <a:p>
+            <a:pPr marL="0" indent="0">
+              <a:buNone/>
+            </a:pPr>
+            <a:r>
+              <a:rPr lang="en-US" dirty="0"/>
+              <a:t>	4</a:t>
+            </a:r>
+            <a:endParaRPr lang="en-US" dirty="0" smtClean="0"/>
+          </a:p>
+          <a:p>
+            <a:pPr marL="0" indent="0">
+              <a:buNone/>
+            </a:pPr>
+            <a:r>
+              <a:rPr lang="en-US" dirty="0"/>
+              <a:t>	</a:t>
+            </a:r>
+            <a:r>
+              <a:rPr lang="en-US" dirty="0" smtClean="0"/>
+              <a:t>10</a:t>
+            </a:r>
+            <a:r>
+              <a:rPr lang="en-US" dirty="0"/>
+              <a:t>	</a:t>
+            </a:r>
+            <a:r>
+              <a:rPr lang="en-US" dirty="0" smtClean="0"/>
+              <a:t>5</a:t>
+            </a:r>
+            <a:endParaRPr lang="en-US" dirty="0"/>
+          </a:p>
+          <a:p>
+            <a:pPr marL="0" indent="0">
+              <a:buNone/>
+            </a:pPr>
+            <a:r>
+              <a:rPr lang="en-US" dirty="0" smtClean="0"/>
+              <a:t>	40 4</a:t>
+            </a:r>
+            <a:endParaRPr lang="en-US" dirty="0"/>
+          </a:p>
+          <a:p>
+            <a:pPr marL="0" indent="0">
+              <a:buNone/>
+            </a:pPr>
+            <a:r>
+              <a:rPr lang="en-US" dirty="0" smtClean="0"/>
+              <a:t>	30 6</a:t>
+            </a:r>
+            <a:endParaRPr lang="en-US" dirty="0"/>
+          </a:p>
+          <a:p>
+            <a:pPr marL="0" indent="0">
+              <a:buNone/>
+            </a:pPr>
+            <a:r>
+              <a:rPr lang="en-US" dirty="0" smtClean="0"/>
+              <a:t>	50 3</a:t>
+            </a:r>
+            <a:endParaRPr lang="en-US" dirty="0"/>
+          </a:p>
+        </p:txBody>
+      </p:sp>
+      <p:sp>
+        <p:nvSpPr>
+          <p:cNvPr id="9" name="Content Placeholder 8"/>
+          <p:cNvSpPr>
+            <a:spLocks noGrp="1"/>
+          </p:cNvSpPr>
+          <p:nvPr>
+            <p:ph sz="half" idx="2"/>
+          </p:nvPr>
+        </p:nvSpPr>
+        <p:spPr/>
+        <p:txBody>
+          <a:bodyPr>
+            <a:normAutofit/>
+          </a:bodyPr>
+          <a:lstStyle/>
+          <a:p>
+            <a:r>
+              <a:rPr lang="en-US" dirty="0" smtClean="0"/>
+              <a:t>Output</a:t>
+            </a:r>
+          </a:p>
+          <a:p>
+            <a:pPr marL="0" indent="0">
+              <a:buNone/>
+            </a:pPr>
+            <a:r>
+              <a:rPr lang="en-US" dirty="0"/>
+              <a:t>	</a:t>
+            </a:r>
+            <a:r>
+              <a:rPr lang="en-US" dirty="0" smtClean="0"/>
+              <a:t>105</a:t>
+            </a:r>
+          </a:p>
+          <a:p>
+            <a:pPr marL="0" indent="0">
+              <a:buNone/>
+            </a:pPr>
+            <a:r>
+              <a:rPr lang="en-US" dirty="0"/>
+              <a:t>	</a:t>
+            </a:r>
+            <a:r>
+              <a:rPr lang="en-US" dirty="0" smtClean="0"/>
+              <a:t>4	1</a:t>
+            </a:r>
+          </a:p>
+          <a:p>
+            <a:pPr marL="0" indent="0">
+              <a:buNone/>
+            </a:pPr>
+            <a:r>
+              <a:rPr lang="en-US" dirty="0"/>
+              <a:t>	</a:t>
+            </a:r>
+            <a:r>
+              <a:rPr lang="en-US" dirty="0" smtClean="0"/>
+              <a:t>2	1</a:t>
+            </a:r>
+          </a:p>
+          <a:p>
+            <a:pPr marL="0" indent="0">
+              <a:buNone/>
+            </a:pPr>
+            <a:r>
+              <a:rPr lang="en-US" dirty="0" smtClean="0"/>
+              <a:t>	3	0.5</a:t>
+            </a:r>
+            <a:endParaRPr lang="en-US" dirty="0"/>
+          </a:p>
+        </p:txBody>
+      </p:sp>
+    </p:spTree>
+    <p:extLst>
+      <p:ext uri="{BB962C8B-B14F-4D97-AF65-F5344CB8AC3E}">
+        <p14:creationId xmlns:p14="http://schemas.microsoft.com/office/powerpoint/2010/main" val="2137860602"/>
+      </p:ext>
+    </p:extLst>
+  </p:cSld>
+  <p:clrMapOvr>
+    <a:masterClrMapping/>
+  </p:clrMapOvr>
+  <p:timing>
+    <p:tnLst>
+      <p:par>
+        <p:cTn id="1" dur="indefinite" restart="never" nodeType="tmRoot"/>
+      </p:par>
+    </p:tnLst>
+  </p:timing>
+</p:sld>
+</file>
+
+<file path=ppt/slides/slide45.xml><?xml version="1.0" encoding="utf-8"?>
+<p:sld xmlns:a="http://schemas.openxmlformats.org/drawingml/2006/main" xmlns:r="http://schemas.openxmlformats.org/officeDocument/2006/relationships" xmlns:p="http://schemas.openxmlformats.org/presentationml/2006/main">
+  <p:cSld>
+    <p:spTree>
+      <p:nvGrpSpPr>
+        <p:cNvPr id="1" name=""/>
+        <p:cNvGrpSpPr/>
+        <p:nvPr/>
+      </p:nvGrpSpPr>
+      <p:grpSpPr>
+        <a:xfrm>
+          <a:off x="0" y="0"/>
+          <a:ext cx="0" cy="0"/>
+          <a:chOff x="0" y="0"/>
+          <a:chExt cx="0" cy="0"/>
+        </a:xfrm>
+      </p:grpSpPr>
+      <p:sp>
+        <p:nvSpPr>
+          <p:cNvPr id="2" name="Title 1"/>
+          <p:cNvSpPr>
+            <a:spLocks noGrp="1"/>
+          </p:cNvSpPr>
+          <p:nvPr>
+            <p:ph type="title"/>
+          </p:nvPr>
+        </p:nvSpPr>
+        <p:spPr/>
+        <p:txBody>
+          <a:bodyPr/>
+          <a:lstStyle/>
+          <a:p>
+            <a:r>
+              <a:rPr lang="en-US" dirty="0" smtClean="0"/>
+              <a:t>Homework</a:t>
+            </a:r>
+            <a:endParaRPr lang="en-US" dirty="0"/>
+          </a:p>
+        </p:txBody>
+      </p:sp>
+      <p:sp>
+        <p:nvSpPr>
+          <p:cNvPr id="5" name="Content Placeholder 4"/>
+          <p:cNvSpPr>
+            <a:spLocks noGrp="1"/>
+          </p:cNvSpPr>
+          <p:nvPr>
+            <p:ph idx="1"/>
+          </p:nvPr>
+        </p:nvSpPr>
+        <p:spPr/>
+        <p:txBody>
+          <a:bodyPr>
+            <a:normAutofit fontScale="77500" lnSpcReduction="20000"/>
+          </a:bodyPr>
+          <a:lstStyle/>
+          <a:p>
+            <a:r>
+              <a:rPr lang="en-US" dirty="0" smtClean="0"/>
+              <a:t>Implements the Optimum-Storage-on-Tape algorithm </a:t>
+            </a:r>
+            <a:r>
+              <a:rPr lang="en-US" smtClean="0"/>
+              <a:t>into program</a:t>
+            </a:r>
+          </a:p>
+          <a:p>
+            <a:r>
+              <a:rPr lang="en-US" dirty="0" smtClean="0"/>
+              <a:t>Please make a pseudocode for fractional knapsack problem based on input/output needed</a:t>
+            </a:r>
+          </a:p>
+          <a:p>
+            <a:r>
+              <a:rPr lang="en-US" dirty="0" smtClean="0"/>
+              <a:t>Implements the algorithm into C/C++ program</a:t>
+            </a:r>
+          </a:p>
+          <a:p>
+            <a:r>
+              <a:rPr lang="en-US" dirty="0" smtClean="0"/>
+              <a:t>Collect your work at May 23</a:t>
+            </a:r>
+            <a:r>
+              <a:rPr lang="en-US" baseline="30000" dirty="0" smtClean="0"/>
+              <a:t>rd </a:t>
+            </a:r>
+            <a:r>
+              <a:rPr lang="en-US" dirty="0" smtClean="0">
+                <a:sym typeface="Wingdings" panose="05000000000000000000" pitchFamily="2" charset="2"/>
+              </a:rPr>
+              <a:t> Hardcopy</a:t>
+            </a:r>
+            <a:endParaRPr lang="en-US" dirty="0" smtClean="0"/>
+          </a:p>
+          <a:p>
+            <a:r>
+              <a:rPr lang="en-US" dirty="0" smtClean="0"/>
+              <a:t>Small quiz </a:t>
+            </a:r>
+            <a:r>
+              <a:rPr lang="en-US" dirty="0" smtClean="0">
+                <a:sym typeface="Wingdings" panose="05000000000000000000" pitchFamily="2" charset="2"/>
+              </a:rPr>
+              <a:t>Greedy Algorithm at May 23</a:t>
+            </a:r>
+            <a:r>
+              <a:rPr lang="en-US" baseline="30000" dirty="0" smtClean="0">
+                <a:sym typeface="Wingdings" panose="05000000000000000000" pitchFamily="2" charset="2"/>
+              </a:rPr>
+              <a:t>rd</a:t>
+            </a:r>
+            <a:r>
+              <a:rPr lang="en-US" baseline="-25000" dirty="0">
+                <a:sym typeface="Wingdings" panose="05000000000000000000" pitchFamily="2" charset="2"/>
+              </a:rPr>
+              <a:t> </a:t>
+            </a:r>
+            <a:r>
+              <a:rPr lang="en-US" dirty="0" smtClean="0">
+                <a:sym typeface="Wingdings" panose="05000000000000000000" pitchFamily="2" charset="2"/>
+              </a:rPr>
+              <a:t> bring your laptop</a:t>
+            </a:r>
+            <a:endParaRPr lang="en-US" dirty="0" smtClean="0"/>
+          </a:p>
+        </p:txBody>
+      </p:sp>
+    </p:spTree>
+    <p:extLst>
+      <p:ext uri="{BB962C8B-B14F-4D97-AF65-F5344CB8AC3E}">
+        <p14:creationId xmlns:p14="http://schemas.microsoft.com/office/powerpoint/2010/main" val="1821821895"/>
       </p:ext>
     </p:extLst>
   </p:cSld>

</xml_diff>

<commit_message>
Updating knapsack fractional problem after class E
</commit_message>
<xml_diff>
--- a/161702/presentation/10 - Greedy Algorithm 2/10. Greedy Algorithm (2).pptx
+++ b/161702/presentation/10 - Greedy Algorithm 2/10. Greedy Algorithm (2).pptx
@@ -18291,7 +18291,7 @@
           <a:graphicData uri="http://schemas.openxmlformats.org/presentationml/2006/ole">
             <mc:AlternateContent xmlns:mc="http://schemas.openxmlformats.org/markup-compatibility/2006">
               <mc:Choice xmlns:v="urn:schemas-microsoft-com:vml" Requires="v">
-                <p:oleObj spid="_x0000_s2112" name="方程式" r:id="rId3" imgW="469800" imgH="266400" progId="Equation.3">
+                <p:oleObj spid="_x0000_s2114" name="方程式" r:id="rId3" imgW="469800" imgH="266400" progId="Equation.3">
                   <p:embed/>
                 </p:oleObj>
               </mc:Choice>
@@ -22366,7 +22366,7 @@
           <a:graphicData uri="http://schemas.openxmlformats.org/presentationml/2006/ole">
             <mc:AlternateContent xmlns:mc="http://schemas.openxmlformats.org/markup-compatibility/2006">
               <mc:Choice xmlns:v="urn:schemas-microsoft-com:vml" Requires="v">
-                <p:oleObj spid="_x0000_s3135" name="方程式" r:id="rId3" imgW="419040" imgH="444240" progId="Equation.3">
+                <p:oleObj spid="_x0000_s3137" name="方程式" r:id="rId3" imgW="419040" imgH="444240" progId="Equation.3">
                   <p:embed/>
                 </p:oleObj>
               </mc:Choice>
@@ -22782,7 +22782,7 @@
           <a:graphicData uri="http://schemas.openxmlformats.org/presentationml/2006/ole">
             <mc:AlternateContent xmlns:mc="http://schemas.openxmlformats.org/markup-compatibility/2006">
               <mc:Choice xmlns:v="urn:schemas-microsoft-com:vml" Requires="v">
-                <p:oleObj spid="_x0000_s4220" name="方程式" r:id="rId3" imgW="457200" imgH="444240" progId="Equation.3">
+                <p:oleObj spid="_x0000_s4224" name="方程式" r:id="rId3" imgW="457200" imgH="444240" progId="Equation.3">
                   <p:embed/>
                 </p:oleObj>
               </mc:Choice>
@@ -22877,7 +22877,7 @@
           <a:graphicData uri="http://schemas.openxmlformats.org/presentationml/2006/ole">
             <mc:AlternateContent xmlns:mc="http://schemas.openxmlformats.org/markup-compatibility/2006">
               <mc:Choice xmlns:v="urn:schemas-microsoft-com:vml" Requires="v">
-                <p:oleObj spid="_x0000_s4221" name="方程式" r:id="rId5" imgW="609480" imgH="457200" progId="Equation.3">
+                <p:oleObj spid="_x0000_s4225" name="方程式" r:id="rId5" imgW="609480" imgH="457200" progId="Equation.3">
                   <p:embed/>
                 </p:oleObj>
               </mc:Choice>
@@ -25628,7 +25628,7 @@
           <a:graphicData uri="http://schemas.openxmlformats.org/presentationml/2006/ole">
             <mc:AlternateContent xmlns:mc="http://schemas.openxmlformats.org/markup-compatibility/2006">
               <mc:Choice xmlns:v="urn:schemas-microsoft-com:vml" Requires="v">
-                <p:oleObj spid="_x0000_s5244" name="Equation" r:id="rId3" imgW="3340080" imgH="622080" progId="Equation.3">
+                <p:oleObj spid="_x0000_s5248" name="Equation" r:id="rId3" imgW="3340080" imgH="622080" progId="Equation.3">
                   <p:embed/>
                 </p:oleObj>
               </mc:Choice>
@@ -25727,7 +25727,7 @@
           <a:graphicData uri="http://schemas.openxmlformats.org/presentationml/2006/ole">
             <mc:AlternateContent xmlns:mc="http://schemas.openxmlformats.org/markup-compatibility/2006">
               <mc:Choice xmlns:v="urn:schemas-microsoft-com:vml" Requires="v">
-                <p:oleObj spid="_x0000_s5245" name="Equation" r:id="rId5" imgW="914400" imgH="622080" progId="Equation.3">
+                <p:oleObj spid="_x0000_s5249" name="Equation" r:id="rId5" imgW="914400" imgH="622080" progId="Equation.3">
                   <p:embed/>
                 </p:oleObj>
               </mc:Choice>
@@ -25852,7 +25852,7 @@
         <p:spPr bwMode="auto">
           <a:xfrm>
             <a:off x="609600" y="533400"/>
-            <a:ext cx="7702550" cy="3460750"/>
+            <a:ext cx="7702550" cy="3785652"/>
           </a:xfrm>
           <a:prstGeom prst="rect">
             <a:avLst/>
@@ -26070,7 +26070,10 @@
               </a:spcBef>
             </a:pPr>
             <a:r>
-              <a:rPr lang="en-US" altLang="zh-CN" dirty="0">
+              <a:rPr lang="en-US" altLang="zh-CN" b="1" dirty="0">
+                <a:solidFill>
+                  <a:srgbClr val="FF0000"/>
+                </a:solidFill>
                 <a:ea typeface="宋体" panose="02010600030101010101" pitchFamily="2" charset="-122"/>
               </a:rPr>
               <a:t>(Max value/weight ratio) Sort the objects based on the value to weight ratios, from the highest to the lowest, then select. </a:t>
@@ -27832,7 +27835,7 @@
           <a:graphicData uri="http://schemas.openxmlformats.org/presentationml/2006/ole">
             <mc:AlternateContent xmlns:mc="http://schemas.openxmlformats.org/markup-compatibility/2006">
               <mc:Choice xmlns:v="urn:schemas-microsoft-com:vml" Requires="v">
-                <p:oleObj spid="_x0000_s6207" name="Equation" r:id="rId3" imgW="3340080" imgH="622080" progId="Equation.3">
+                <p:oleObj spid="_x0000_s6209" name="Equation" r:id="rId3" imgW="3340080" imgH="622080" progId="Equation.3">
                   <p:embed/>
                 </p:oleObj>
               </mc:Choice>

</xml_diff>